<commit_message>
adding hashing lab files
</commit_message>
<xml_diff>
--- a/Labs/Hashing Lab/Hashing Lab S2020.pptx
+++ b/Labs/Hashing Lab/Hashing Lab S2020.pptx
@@ -157,18 +157,6 @@
 </p:presentation>
 </file>
 
-<file path=ppt/commentAuthors.xml><?xml version="1.0" encoding="utf-8"?>
-<p:cmAuthorLst xmlns:a="http://schemas.openxmlformats.org/drawingml/2006/main" xmlns:r="http://schemas.openxmlformats.org/officeDocument/2006/relationships" xmlns:p="http://schemas.openxmlformats.org/presentationml/2006/main">
-  <p:cmAuthor id="1" name="searingarrowssbm@gmail.com" initials="s" lastIdx="1" clrIdx="0">
-    <p:extLst>
-      <p:ext uri="{19B8F6BF-5375-455C-9EA6-DF929625EA0E}">
-        <p15:presenceInfo xmlns:p15="http://schemas.microsoft.com/office/powerpoint/2012/main" userId="05cfa7b60c7fb302" providerId="Windows Live"/>
-      </p:ext>
-    </p:extLst>
-  </p:cmAuthor>
-</p:cmAuthorLst>
-</file>
-
 <file path=ppt/notesMasters/notesMaster1.xml><?xml version="1.0" encoding="utf-8"?>
 <p:notesMaster xmlns:a="http://schemas.openxmlformats.org/drawingml/2006/main" xmlns:r="http://schemas.openxmlformats.org/officeDocument/2006/relationships" xmlns:p="http://schemas.openxmlformats.org/presentationml/2006/main">
   <p:cSld>
@@ -251,7 +239,7 @@
           <a:p>
             <a:fld id="{38585FD9-73E9-4662-9A33-270BCE8599E1}" type="datetimeFigureOut">
               <a:rPr lang="en-US" smtClean="0"/>
-              <a:t>3/19/2020</a:t>
+              <a:t>3/24/2020</a:t>
             </a:fld>
             <a:endParaRPr lang="en-US"/>
           </a:p>
@@ -5412,14 +5400,11 @@
               </a:lstStyle>
               <a:p>
                 <a:pPr algn="ctr"/>
-                <a:r>
-                  <a:rPr lang="en-US" sz="1200" b="1" dirty="0">
-                    <a:solidFill>
-                      <a:srgbClr val="FF0000"/>
-                    </a:solidFill>
-                  </a:rPr>
-                  <a:t>123</a:t>
-                </a:r>
+                <a:endParaRPr lang="en-US" sz="1200" b="1" dirty="0">
+                  <a:solidFill>
+                    <a:srgbClr val="FF0000"/>
+                  </a:solidFill>
+                </a:endParaRPr>
               </a:p>
             </p:txBody>
           </p:sp>
@@ -5555,7 +5540,7 @@
                 <a:pPr algn="ctr"/>
                 <a:r>
                   <a:rPr lang="en-US" sz="1200" dirty="0"/>
-                  <a:t>27</a:t>
+                  <a:t>4</a:t>
                 </a:r>
               </a:p>
             </p:txBody>
@@ -5974,7 +5959,7 @@
                       <a:srgbClr val="FF0000"/>
                     </a:solidFill>
                   </a:rPr>
-                  <a:t>4</a:t>
+                  <a:t>123</a:t>
                 </a:r>
               </a:p>
             </p:txBody>
@@ -6109,7 +6094,10 @@
               </a:lstStyle>
               <a:p>
                 <a:pPr algn="ctr"/>
-                <a:endParaRPr lang="en-US" sz="1200" dirty="0"/>
+                <a:r>
+                  <a:rPr lang="en-US" sz="1200" dirty="0"/>
+                  <a:t>27</a:t>
+                </a:r>
               </a:p>
             </p:txBody>
           </p:sp>
@@ -9071,10 +9059,10 @@
       </p:grpSp>
       <p:sp>
         <p:nvSpPr>
-          <p:cNvPr id="47" name="Rectangle 10">
+          <p:cNvPr id="47" name="Rectangle 8">
             <a:extLst>
               <a:ext uri="{FF2B5EF4-FFF2-40B4-BE49-F238E27FC236}">
-                <a16:creationId xmlns:a16="http://schemas.microsoft.com/office/drawing/2014/main" id="{70BB7A51-A07C-40A2-900A-9492E57FD409}"/>
+                <a16:creationId xmlns:a16="http://schemas.microsoft.com/office/drawing/2014/main" id="{CE4E5E02-651A-4653-B391-CB4C44D7E001}"/>
               </a:ext>
             </a:extLst>
           </p:cNvPr>
@@ -9085,7 +9073,7 @@
         </p:nvSpPr>
         <p:spPr bwMode="auto">
           <a:xfrm>
-            <a:off x="6134858" y="2696619"/>
+            <a:off x="6168450" y="2237598"/>
             <a:ext cx="454836" cy="226753"/>
           </a:xfrm>
           <a:prstGeom prst="rect">
@@ -9207,7 +9195,7 @@
             <a:pPr algn="ctr"/>
             <a:r>
               <a:rPr lang="en-US" sz="1200" dirty="0"/>
-              <a:t>23</a:t>
+              <a:t>121</a:t>
             </a:r>
           </a:p>
         </p:txBody>
@@ -9217,7 +9205,7 @@
           <p:cNvPr id="48" name="Rectangle 10">
             <a:extLst>
               <a:ext uri="{FF2B5EF4-FFF2-40B4-BE49-F238E27FC236}">
-                <a16:creationId xmlns:a16="http://schemas.microsoft.com/office/drawing/2014/main" id="{5D1785A7-AEB6-4616-98E7-5892570A29D1}"/>
+                <a16:creationId xmlns:a16="http://schemas.microsoft.com/office/drawing/2014/main" id="{78E4F67C-6033-47A2-A1DE-2FB74CB60D37}"/>
               </a:ext>
             </a:extLst>
           </p:cNvPr>
@@ -9228,7 +9216,7 @@
         </p:nvSpPr>
         <p:spPr bwMode="auto">
           <a:xfrm>
-            <a:off x="6134858" y="2928887"/>
+            <a:off x="6168450" y="2699376"/>
             <a:ext cx="454836" cy="226753"/>
           </a:xfrm>
           <a:prstGeom prst="rect">
@@ -9350,7 +9338,7 @@
             <a:pPr algn="ctr"/>
             <a:r>
               <a:rPr lang="en-US" sz="1200" dirty="0"/>
-              <a:t>114</a:t>
+              <a:t>23</a:t>
             </a:r>
           </a:p>
         </p:txBody>
@@ -9360,7 +9348,7 @@
           <p:cNvPr id="49" name="Rectangle 10">
             <a:extLst>
               <a:ext uri="{FF2B5EF4-FFF2-40B4-BE49-F238E27FC236}">
-                <a16:creationId xmlns:a16="http://schemas.microsoft.com/office/drawing/2014/main" id="{8351A63D-A63A-4742-B015-BFB0B7417513}"/>
+                <a16:creationId xmlns:a16="http://schemas.microsoft.com/office/drawing/2014/main" id="{08DAE36E-E966-4DD0-9226-9BD80735402E}"/>
               </a:ext>
             </a:extLst>
           </p:cNvPr>
@@ -9371,7 +9359,7 @@
         </p:nvSpPr>
         <p:spPr bwMode="auto">
           <a:xfrm>
-            <a:off x="6640825" y="2702748"/>
+            <a:off x="6678510" y="2699376"/>
             <a:ext cx="454836" cy="226753"/>
           </a:xfrm>
           <a:prstGeom prst="rect">
@@ -9493,17 +9481,17 @@
             <a:pPr algn="ctr"/>
             <a:r>
               <a:rPr lang="en-US" sz="1200" dirty="0"/>
-              <a:t>54</a:t>
+              <a:t>53</a:t>
             </a:r>
           </a:p>
         </p:txBody>
       </p:sp>
       <p:sp>
         <p:nvSpPr>
-          <p:cNvPr id="50" name="Rectangle 10">
+          <p:cNvPr id="50" name="Rectangle 11">
             <a:extLst>
               <a:ext uri="{FF2B5EF4-FFF2-40B4-BE49-F238E27FC236}">
-                <a16:creationId xmlns:a16="http://schemas.microsoft.com/office/drawing/2014/main" id="{41DD5B62-0558-4CB9-885C-6D3C4B67BBDF}"/>
+                <a16:creationId xmlns:a16="http://schemas.microsoft.com/office/drawing/2014/main" id="{5AB9C64F-A326-434C-BCD7-42202FAC4B0A}"/>
               </a:ext>
             </a:extLst>
           </p:cNvPr>
@@ -9514,7 +9502,7 @@
         </p:nvSpPr>
         <p:spPr bwMode="auto">
           <a:xfrm>
-            <a:off x="6134858" y="2237598"/>
+            <a:off x="6168450" y="2928887"/>
             <a:ext cx="454836" cy="226753"/>
           </a:xfrm>
           <a:prstGeom prst="rect">
@@ -9636,7 +9624,150 @@
             <a:pPr algn="ctr"/>
             <a:r>
               <a:rPr lang="en-US" sz="1200" dirty="0"/>
-              <a:t>121</a:t>
+              <a:t>114</a:t>
+            </a:r>
+          </a:p>
+        </p:txBody>
+      </p:sp>
+      <p:sp>
+        <p:nvSpPr>
+          <p:cNvPr id="51" name="Rectangle 8">
+            <a:extLst>
+              <a:ext uri="{FF2B5EF4-FFF2-40B4-BE49-F238E27FC236}">
+                <a16:creationId xmlns:a16="http://schemas.microsoft.com/office/drawing/2014/main" id="{87168AC1-DCED-47FB-8059-C4C667693AA8}"/>
+              </a:ext>
+            </a:extLst>
+          </p:cNvPr>
+          <p:cNvSpPr>
+            <a:spLocks noChangeArrowheads="1"/>
+          </p:cNvSpPr>
+          <p:nvPr/>
+        </p:nvSpPr>
+        <p:spPr bwMode="auto">
+          <a:xfrm>
+            <a:off x="6676026" y="2231677"/>
+            <a:ext cx="454836" cy="226753"/>
+          </a:xfrm>
+          <a:prstGeom prst="rect">
+            <a:avLst/>
+          </a:prstGeom>
+          <a:solidFill>
+            <a:schemeClr val="bg1"/>
+          </a:solidFill>
+          <a:ln w="9525" algn="ctr">
+            <a:solidFill>
+              <a:schemeClr val="tx1"/>
+            </a:solidFill>
+            <a:round/>
+            <a:headEnd/>
+            <a:tailEnd/>
+          </a:ln>
+        </p:spPr>
+        <p:txBody>
+          <a:bodyPr lIns="0" tIns="0" rIns="0" bIns="0"/>
+          <a:lstStyle>
+            <a:lvl1pPr>
+              <a:defRPr sz="2400">
+                <a:solidFill>
+                  <a:schemeClr val="tx1"/>
+                </a:solidFill>
+                <a:latin typeface="Times New Roman" panose="02020603050405020304" pitchFamily="18" charset="0"/>
+              </a:defRPr>
+            </a:lvl1pPr>
+            <a:lvl2pPr marL="742950" indent="-285750">
+              <a:defRPr sz="2400">
+                <a:solidFill>
+                  <a:schemeClr val="tx1"/>
+                </a:solidFill>
+                <a:latin typeface="Times New Roman" panose="02020603050405020304" pitchFamily="18" charset="0"/>
+              </a:defRPr>
+            </a:lvl2pPr>
+            <a:lvl3pPr marL="1143000" indent="-228600">
+              <a:defRPr sz="2400">
+                <a:solidFill>
+                  <a:schemeClr val="tx1"/>
+                </a:solidFill>
+                <a:latin typeface="Times New Roman" panose="02020603050405020304" pitchFamily="18" charset="0"/>
+              </a:defRPr>
+            </a:lvl3pPr>
+            <a:lvl4pPr marL="1600200" indent="-228600">
+              <a:defRPr sz="2400">
+                <a:solidFill>
+                  <a:schemeClr val="tx1"/>
+                </a:solidFill>
+                <a:latin typeface="Times New Roman" panose="02020603050405020304" pitchFamily="18" charset="0"/>
+              </a:defRPr>
+            </a:lvl4pPr>
+            <a:lvl5pPr marL="2057400" indent="-228600">
+              <a:defRPr sz="2400">
+                <a:solidFill>
+                  <a:schemeClr val="tx1"/>
+                </a:solidFill>
+                <a:latin typeface="Times New Roman" panose="02020603050405020304" pitchFamily="18" charset="0"/>
+              </a:defRPr>
+            </a:lvl5pPr>
+            <a:lvl6pPr marL="2514600" indent="-228600" eaLnBrk="0" fontAlgn="base" hangingPunct="0">
+              <a:spcBef>
+                <a:spcPct val="0"/>
+              </a:spcBef>
+              <a:spcAft>
+                <a:spcPct val="0"/>
+              </a:spcAft>
+              <a:defRPr sz="2400">
+                <a:solidFill>
+                  <a:schemeClr val="tx1"/>
+                </a:solidFill>
+                <a:latin typeface="Times New Roman" panose="02020603050405020304" pitchFamily="18" charset="0"/>
+              </a:defRPr>
+            </a:lvl6pPr>
+            <a:lvl7pPr marL="2971800" indent="-228600" eaLnBrk="0" fontAlgn="base" hangingPunct="0">
+              <a:spcBef>
+                <a:spcPct val="0"/>
+              </a:spcBef>
+              <a:spcAft>
+                <a:spcPct val="0"/>
+              </a:spcAft>
+              <a:defRPr sz="2400">
+                <a:solidFill>
+                  <a:schemeClr val="tx1"/>
+                </a:solidFill>
+                <a:latin typeface="Times New Roman" panose="02020603050405020304" pitchFamily="18" charset="0"/>
+              </a:defRPr>
+            </a:lvl7pPr>
+            <a:lvl8pPr marL="3429000" indent="-228600" eaLnBrk="0" fontAlgn="base" hangingPunct="0">
+              <a:spcBef>
+                <a:spcPct val="0"/>
+              </a:spcBef>
+              <a:spcAft>
+                <a:spcPct val="0"/>
+              </a:spcAft>
+              <a:defRPr sz="2400">
+                <a:solidFill>
+                  <a:schemeClr val="tx1"/>
+                </a:solidFill>
+                <a:latin typeface="Times New Roman" panose="02020603050405020304" pitchFamily="18" charset="0"/>
+              </a:defRPr>
+            </a:lvl8pPr>
+            <a:lvl9pPr marL="3886200" indent="-228600" eaLnBrk="0" fontAlgn="base" hangingPunct="0">
+              <a:spcBef>
+                <a:spcPct val="0"/>
+              </a:spcBef>
+              <a:spcAft>
+                <a:spcPct val="0"/>
+              </a:spcAft>
+              <a:defRPr sz="2400">
+                <a:solidFill>
+                  <a:schemeClr val="tx1"/>
+                </a:solidFill>
+                <a:latin typeface="Times New Roman" panose="02020603050405020304" pitchFamily="18" charset="0"/>
+              </a:defRPr>
+            </a:lvl9pPr>
+          </a:lstStyle>
+          <a:p>
+            <a:pPr algn="ctr"/>
+            <a:r>
+              <a:rPr lang="en-US" sz="1200" dirty="0"/>
+              <a:t>12</a:t>
             </a:r>
           </a:p>
         </p:txBody>
@@ -11005,8 +11136,189 @@
         </p:nvSpPr>
         <p:spPr bwMode="auto">
           <a:xfrm>
-            <a:off x="2041525" y="2805113"/>
-            <a:ext cx="2031325" cy="338554"/>
+            <a:off x="2075316" y="2805113"/>
+            <a:ext cx="1997534" cy="584775"/>
+          </a:xfrm>
+          <a:prstGeom prst="rect">
+            <a:avLst/>
+          </a:prstGeom>
+          <a:noFill/>
+          <a:ln>
+            <a:noFill/>
+          </a:ln>
+          <a:extLst>
+            <a:ext uri="{909E8E84-426E-40DD-AFC4-6F175D3DCCD1}">
+              <a14:hiddenFill xmlns:a14="http://schemas.microsoft.com/office/drawing/2010/main">
+                <a:solidFill>
+                  <a:srgbClr val="FFFFFF"/>
+                </a:solidFill>
+              </a14:hiddenFill>
+            </a:ext>
+            <a:ext uri="{91240B29-F687-4F45-9708-019B960494DF}">
+              <a14:hiddenLine xmlns:a14="http://schemas.microsoft.com/office/drawing/2010/main" w="9525">
+                <a:solidFill>
+                  <a:srgbClr val="000000"/>
+                </a:solidFill>
+                <a:miter lim="800000"/>
+                <a:headEnd/>
+                <a:tailEnd/>
+              </a14:hiddenLine>
+            </a:ext>
+          </a:extLst>
+        </p:spPr>
+        <p:txBody>
+          <a:bodyPr wrap="square">
+            <a:spAutoFit/>
+          </a:bodyPr>
+          <a:lstStyle>
+            <a:lvl1pPr>
+              <a:spcBef>
+                <a:spcPct val="20000"/>
+              </a:spcBef>
+              <a:buChar char="•"/>
+              <a:defRPr sz="3200">
+                <a:solidFill>
+                  <a:schemeClr val="tx1"/>
+                </a:solidFill>
+                <a:latin typeface="Times New Roman" panose="02020603050405020304" pitchFamily="18" charset="0"/>
+              </a:defRPr>
+            </a:lvl1pPr>
+            <a:lvl2pPr marL="742950" indent="-285750">
+              <a:spcBef>
+                <a:spcPct val="20000"/>
+              </a:spcBef>
+              <a:buChar char="–"/>
+              <a:defRPr sz="2800">
+                <a:solidFill>
+                  <a:schemeClr val="tx1"/>
+                </a:solidFill>
+                <a:latin typeface="Times New Roman" panose="02020603050405020304" pitchFamily="18" charset="0"/>
+              </a:defRPr>
+            </a:lvl2pPr>
+            <a:lvl3pPr marL="1143000" indent="-228600">
+              <a:spcBef>
+                <a:spcPct val="20000"/>
+              </a:spcBef>
+              <a:buChar char="•"/>
+              <a:defRPr sz="2400">
+                <a:solidFill>
+                  <a:schemeClr val="tx1"/>
+                </a:solidFill>
+                <a:latin typeface="Times New Roman" panose="02020603050405020304" pitchFamily="18" charset="0"/>
+              </a:defRPr>
+            </a:lvl3pPr>
+            <a:lvl4pPr marL="1600200" indent="-228600">
+              <a:spcBef>
+                <a:spcPct val="20000"/>
+              </a:spcBef>
+              <a:buChar char="–"/>
+              <a:defRPr sz="2000">
+                <a:solidFill>
+                  <a:schemeClr val="tx1"/>
+                </a:solidFill>
+                <a:latin typeface="Times New Roman" panose="02020603050405020304" pitchFamily="18" charset="0"/>
+              </a:defRPr>
+            </a:lvl4pPr>
+            <a:lvl5pPr marL="2057400" indent="-228600">
+              <a:spcBef>
+                <a:spcPct val="20000"/>
+              </a:spcBef>
+              <a:buChar char="»"/>
+              <a:defRPr sz="2000">
+                <a:solidFill>
+                  <a:schemeClr val="tx1"/>
+                </a:solidFill>
+                <a:latin typeface="Times New Roman" panose="02020603050405020304" pitchFamily="18" charset="0"/>
+              </a:defRPr>
+            </a:lvl5pPr>
+            <a:lvl6pPr marL="2514600" indent="-228600" eaLnBrk="0" fontAlgn="base" hangingPunct="0">
+              <a:spcBef>
+                <a:spcPct val="20000"/>
+              </a:spcBef>
+              <a:spcAft>
+                <a:spcPct val="0"/>
+              </a:spcAft>
+              <a:buChar char="»"/>
+              <a:defRPr sz="2000">
+                <a:solidFill>
+                  <a:schemeClr val="tx1"/>
+                </a:solidFill>
+                <a:latin typeface="Times New Roman" panose="02020603050405020304" pitchFamily="18" charset="0"/>
+              </a:defRPr>
+            </a:lvl6pPr>
+            <a:lvl7pPr marL="2971800" indent="-228600" eaLnBrk="0" fontAlgn="base" hangingPunct="0">
+              <a:spcBef>
+                <a:spcPct val="20000"/>
+              </a:spcBef>
+              <a:spcAft>
+                <a:spcPct val="0"/>
+              </a:spcAft>
+              <a:buChar char="»"/>
+              <a:defRPr sz="2000">
+                <a:solidFill>
+                  <a:schemeClr val="tx1"/>
+                </a:solidFill>
+                <a:latin typeface="Times New Roman" panose="02020603050405020304" pitchFamily="18" charset="0"/>
+              </a:defRPr>
+            </a:lvl7pPr>
+            <a:lvl8pPr marL="3429000" indent="-228600" eaLnBrk="0" fontAlgn="base" hangingPunct="0">
+              <a:spcBef>
+                <a:spcPct val="20000"/>
+              </a:spcBef>
+              <a:spcAft>
+                <a:spcPct val="0"/>
+              </a:spcAft>
+              <a:buChar char="»"/>
+              <a:defRPr sz="2000">
+                <a:solidFill>
+                  <a:schemeClr val="tx1"/>
+                </a:solidFill>
+                <a:latin typeface="Times New Roman" panose="02020603050405020304" pitchFamily="18" charset="0"/>
+              </a:defRPr>
+            </a:lvl8pPr>
+            <a:lvl9pPr marL="3886200" indent="-228600" eaLnBrk="0" fontAlgn="base" hangingPunct="0">
+              <a:spcBef>
+                <a:spcPct val="20000"/>
+              </a:spcBef>
+              <a:spcAft>
+                <a:spcPct val="0"/>
+              </a:spcAft>
+              <a:buChar char="»"/>
+              <a:defRPr sz="2000">
+                <a:solidFill>
+                  <a:schemeClr val="tx1"/>
+                </a:solidFill>
+                <a:latin typeface="Times New Roman" panose="02020603050405020304" pitchFamily="18" charset="0"/>
+              </a:defRPr>
+            </a:lvl9pPr>
+          </a:lstStyle>
+          <a:p>
+            <a:pPr>
+              <a:spcBef>
+                <a:spcPct val="0"/>
+              </a:spcBef>
+              <a:buFontTx/>
+              <a:buNone/>
+            </a:pPr>
+            <a:r>
+              <a:rPr lang="en-US" sz="1600" dirty="0"/>
+              <a:t>53		</a:t>
+            </a:r>
+          </a:p>
+        </p:txBody>
+      </p:sp>
+      <p:sp>
+        <p:nvSpPr>
+          <p:cNvPr id="4113" name="Text Box 18"/>
+          <p:cNvSpPr txBox="1">
+            <a:spLocks noChangeArrowheads="1"/>
+          </p:cNvSpPr>
+          <p:nvPr/>
+        </p:nvSpPr>
+        <p:spPr bwMode="auto">
+          <a:xfrm>
+            <a:off x="2005488" y="3242847"/>
+            <a:ext cx="287258" cy="338554"/>
           </a:xfrm>
           <a:prstGeom prst="rect">
             <a:avLst/>
@@ -11171,188 +11483,7 @@
             </a:pPr>
             <a:r>
               <a:rPr lang="en-US" sz="1600" dirty="0"/>
-              <a:t>54		</a:t>
-            </a:r>
-          </a:p>
-        </p:txBody>
-      </p:sp>
-      <p:sp>
-        <p:nvSpPr>
-          <p:cNvPr id="4113" name="Text Box 18"/>
-          <p:cNvSpPr txBox="1">
-            <a:spLocks noChangeArrowheads="1"/>
-          </p:cNvSpPr>
-          <p:nvPr/>
-        </p:nvSpPr>
-        <p:spPr bwMode="auto">
-          <a:xfrm>
-            <a:off x="2041525" y="3262313"/>
-            <a:ext cx="492443" cy="338554"/>
-          </a:xfrm>
-          <a:prstGeom prst="rect">
-            <a:avLst/>
-          </a:prstGeom>
-          <a:noFill/>
-          <a:ln>
-            <a:noFill/>
-          </a:ln>
-          <a:extLst>
-            <a:ext uri="{909E8E84-426E-40DD-AFC4-6F175D3DCCD1}">
-              <a14:hiddenFill xmlns:a14="http://schemas.microsoft.com/office/drawing/2010/main">
-                <a:solidFill>
-                  <a:srgbClr val="FFFFFF"/>
-                </a:solidFill>
-              </a14:hiddenFill>
-            </a:ext>
-            <a:ext uri="{91240B29-F687-4F45-9708-019B960494DF}">
-              <a14:hiddenLine xmlns:a14="http://schemas.microsoft.com/office/drawing/2010/main" w="9525">
-                <a:solidFill>
-                  <a:srgbClr val="000000"/>
-                </a:solidFill>
-                <a:miter lim="800000"/>
-                <a:headEnd/>
-                <a:tailEnd/>
-              </a14:hiddenLine>
-            </a:ext>
-          </a:extLst>
-        </p:spPr>
-        <p:txBody>
-          <a:bodyPr wrap="none">
-            <a:spAutoFit/>
-          </a:bodyPr>
-          <a:lstStyle>
-            <a:lvl1pPr>
-              <a:spcBef>
-                <a:spcPct val="20000"/>
-              </a:spcBef>
-              <a:buChar char="•"/>
-              <a:defRPr sz="3200">
-                <a:solidFill>
-                  <a:schemeClr val="tx1"/>
-                </a:solidFill>
-                <a:latin typeface="Times New Roman" panose="02020603050405020304" pitchFamily="18" charset="0"/>
-              </a:defRPr>
-            </a:lvl1pPr>
-            <a:lvl2pPr marL="742950" indent="-285750">
-              <a:spcBef>
-                <a:spcPct val="20000"/>
-              </a:spcBef>
-              <a:buChar char="–"/>
-              <a:defRPr sz="2800">
-                <a:solidFill>
-                  <a:schemeClr val="tx1"/>
-                </a:solidFill>
-                <a:latin typeface="Times New Roman" panose="02020603050405020304" pitchFamily="18" charset="0"/>
-              </a:defRPr>
-            </a:lvl2pPr>
-            <a:lvl3pPr marL="1143000" indent="-228600">
-              <a:spcBef>
-                <a:spcPct val="20000"/>
-              </a:spcBef>
-              <a:buChar char="•"/>
-              <a:defRPr sz="2400">
-                <a:solidFill>
-                  <a:schemeClr val="tx1"/>
-                </a:solidFill>
-                <a:latin typeface="Times New Roman" panose="02020603050405020304" pitchFamily="18" charset="0"/>
-              </a:defRPr>
-            </a:lvl3pPr>
-            <a:lvl4pPr marL="1600200" indent="-228600">
-              <a:spcBef>
-                <a:spcPct val="20000"/>
-              </a:spcBef>
-              <a:buChar char="–"/>
-              <a:defRPr sz="2000">
-                <a:solidFill>
-                  <a:schemeClr val="tx1"/>
-                </a:solidFill>
-                <a:latin typeface="Times New Roman" panose="02020603050405020304" pitchFamily="18" charset="0"/>
-              </a:defRPr>
-            </a:lvl4pPr>
-            <a:lvl5pPr marL="2057400" indent="-228600">
-              <a:spcBef>
-                <a:spcPct val="20000"/>
-              </a:spcBef>
-              <a:buChar char="»"/>
-              <a:defRPr sz="2000">
-                <a:solidFill>
-                  <a:schemeClr val="tx1"/>
-                </a:solidFill>
-                <a:latin typeface="Times New Roman" panose="02020603050405020304" pitchFamily="18" charset="0"/>
-              </a:defRPr>
-            </a:lvl5pPr>
-            <a:lvl6pPr marL="2514600" indent="-228600" eaLnBrk="0" fontAlgn="base" hangingPunct="0">
-              <a:spcBef>
-                <a:spcPct val="20000"/>
-              </a:spcBef>
-              <a:spcAft>
-                <a:spcPct val="0"/>
-              </a:spcAft>
-              <a:buChar char="»"/>
-              <a:defRPr sz="2000">
-                <a:solidFill>
-                  <a:schemeClr val="tx1"/>
-                </a:solidFill>
-                <a:latin typeface="Times New Roman" panose="02020603050405020304" pitchFamily="18" charset="0"/>
-              </a:defRPr>
-            </a:lvl6pPr>
-            <a:lvl7pPr marL="2971800" indent="-228600" eaLnBrk="0" fontAlgn="base" hangingPunct="0">
-              <a:spcBef>
-                <a:spcPct val="20000"/>
-              </a:spcBef>
-              <a:spcAft>
-                <a:spcPct val="0"/>
-              </a:spcAft>
-              <a:buChar char="»"/>
-              <a:defRPr sz="2000">
-                <a:solidFill>
-                  <a:schemeClr val="tx1"/>
-                </a:solidFill>
-                <a:latin typeface="Times New Roman" panose="02020603050405020304" pitchFamily="18" charset="0"/>
-              </a:defRPr>
-            </a:lvl7pPr>
-            <a:lvl8pPr marL="3429000" indent="-228600" eaLnBrk="0" fontAlgn="base" hangingPunct="0">
-              <a:spcBef>
-                <a:spcPct val="20000"/>
-              </a:spcBef>
-              <a:spcAft>
-                <a:spcPct val="0"/>
-              </a:spcAft>
-              <a:buChar char="»"/>
-              <a:defRPr sz="2000">
-                <a:solidFill>
-                  <a:schemeClr val="tx1"/>
-                </a:solidFill>
-                <a:latin typeface="Times New Roman" panose="02020603050405020304" pitchFamily="18" charset="0"/>
-              </a:defRPr>
-            </a:lvl8pPr>
-            <a:lvl9pPr marL="3886200" indent="-228600" eaLnBrk="0" fontAlgn="base" hangingPunct="0">
-              <a:spcBef>
-                <a:spcPct val="20000"/>
-              </a:spcBef>
-              <a:spcAft>
-                <a:spcPct val="0"/>
-              </a:spcAft>
-              <a:buChar char="»"/>
-              <a:defRPr sz="2000">
-                <a:solidFill>
-                  <a:schemeClr val="tx1"/>
-                </a:solidFill>
-                <a:latin typeface="Times New Roman" panose="02020603050405020304" pitchFamily="18" charset="0"/>
-              </a:defRPr>
-            </a:lvl9pPr>
-          </a:lstStyle>
-          <a:p>
-            <a:pPr>
-              <a:spcBef>
-                <a:spcPct val="0"/>
-              </a:spcBef>
-              <a:buFontTx/>
-              <a:buNone/>
-            </a:pPr>
-            <a:r>
-              <a:rPr lang="en-US" sz="1600" dirty="0"/>
-              <a:t>135</a:t>
+              <a:t>4</a:t>
             </a:r>
           </a:p>
         </p:txBody>
@@ -11549,7 +11680,7 @@
         <p:spPr bwMode="auto">
           <a:xfrm>
             <a:off x="2057400" y="4287838"/>
-            <a:ext cx="2031325" cy="338554"/>
+            <a:ext cx="1980029" cy="338554"/>
           </a:xfrm>
           <a:prstGeom prst="rect">
             <a:avLst/>
@@ -11714,7 +11845,7 @@
             </a:pPr>
             <a:r>
               <a:rPr lang="en-US" sz="1600" dirty="0"/>
-              <a:t>49                               </a:t>
+              <a:t>27                               </a:t>
             </a:r>
           </a:p>
         </p:txBody>
@@ -11730,7 +11861,7 @@
         <p:spPr bwMode="auto">
           <a:xfrm>
             <a:off x="2057400" y="4745038"/>
-            <a:ext cx="492443" cy="338554"/>
+            <a:ext cx="389850" cy="338554"/>
           </a:xfrm>
           <a:prstGeom prst="rect">
             <a:avLst/>
@@ -11895,7 +12026,7 @@
             </a:pPr>
             <a:r>
               <a:rPr lang="en-US" sz="1600" dirty="0"/>
-              <a:t>174</a:t>
+              <a:t>21</a:t>
             </a:r>
           </a:p>
         </p:txBody>
@@ -12076,7 +12207,7 @@
             </a:pPr>
             <a:r>
               <a:rPr lang="en-US" sz="1600" dirty="0"/>
-              <a:t>27		</a:t>
+              <a:t>12		</a:t>
             </a:r>
           </a:p>
         </p:txBody>
@@ -12267,7 +12398,7 @@
           <p:cNvPr id="23" name="Text Box 18">
             <a:extLst>
               <a:ext uri="{FF2B5EF4-FFF2-40B4-BE49-F238E27FC236}">
-                <a16:creationId xmlns:a16="http://schemas.microsoft.com/office/drawing/2014/main" id="{E401EBCB-5ECF-47E0-851C-3FEF3830D6B4}"/>
+                <a16:creationId xmlns:a16="http://schemas.microsoft.com/office/drawing/2014/main" id="{B73E2AE3-5455-4C54-A397-AA451B73A6E6}"/>
               </a:ext>
             </a:extLst>
           </p:cNvPr>
@@ -12278,7 +12409,7 @@
         </p:nvSpPr>
         <p:spPr bwMode="auto">
           <a:xfrm>
-            <a:off x="5125879" y="2796096"/>
+            <a:off x="5128025" y="2793143"/>
             <a:ext cx="287258" cy="338554"/>
           </a:xfrm>
           <a:prstGeom prst="rect">
@@ -12451,10 +12582,10 @@
       </p:sp>
       <p:sp>
         <p:nvSpPr>
-          <p:cNvPr id="25" name="Text Box 18">
+          <p:cNvPr id="24" name="Text Box 18">
             <a:extLst>
               <a:ext uri="{FF2B5EF4-FFF2-40B4-BE49-F238E27FC236}">
-                <a16:creationId xmlns:a16="http://schemas.microsoft.com/office/drawing/2014/main" id="{50B785B7-DFF6-4156-91AB-A5E642484D63}"/>
+                <a16:creationId xmlns:a16="http://schemas.microsoft.com/office/drawing/2014/main" id="{523055B8-D4F0-46AB-9B19-B5CA24EE30E3}"/>
               </a:ext>
             </a:extLst>
           </p:cNvPr>
@@ -12465,7 +12596,7 @@
         </p:nvSpPr>
         <p:spPr bwMode="auto">
           <a:xfrm>
-            <a:off x="5125879" y="3276600"/>
+            <a:off x="5128025" y="3236289"/>
             <a:ext cx="287258" cy="338554"/>
           </a:xfrm>
           <a:prstGeom prst="rect">
@@ -12638,10 +12769,10 @@
       </p:sp>
       <p:sp>
         <p:nvSpPr>
-          <p:cNvPr id="26" name="Text Box 18">
+          <p:cNvPr id="25" name="Text Box 18">
             <a:extLst>
               <a:ext uri="{FF2B5EF4-FFF2-40B4-BE49-F238E27FC236}">
-                <a16:creationId xmlns:a16="http://schemas.microsoft.com/office/drawing/2014/main" id="{2E099E26-0194-4962-A5E9-26F7CC45655D}"/>
+                <a16:creationId xmlns:a16="http://schemas.microsoft.com/office/drawing/2014/main" id="{DAFF32B7-BF93-4572-B1A2-14B389842E82}"/>
               </a:ext>
             </a:extLst>
           </p:cNvPr>
@@ -12652,7 +12783,7 @@
         </p:nvSpPr>
         <p:spPr bwMode="auto">
           <a:xfrm>
-            <a:off x="5125879" y="3746992"/>
+            <a:off x="5128025" y="3744494"/>
             <a:ext cx="287258" cy="338554"/>
           </a:xfrm>
           <a:prstGeom prst="rect">
@@ -12825,10 +12956,10 @@
       </p:sp>
       <p:sp>
         <p:nvSpPr>
-          <p:cNvPr id="27" name="Text Box 18">
+          <p:cNvPr id="26" name="Text Box 18">
             <a:extLst>
               <a:ext uri="{FF2B5EF4-FFF2-40B4-BE49-F238E27FC236}">
-                <a16:creationId xmlns:a16="http://schemas.microsoft.com/office/drawing/2014/main" id="{296E021B-2509-4FC5-A65D-39D4D9B929A2}"/>
+                <a16:creationId xmlns:a16="http://schemas.microsoft.com/office/drawing/2014/main" id="{EF5E85D3-BB11-4E0E-93C4-DB4FA0F6F5FB}"/>
               </a:ext>
             </a:extLst>
           </p:cNvPr>
@@ -12839,7 +12970,7 @@
         </p:nvSpPr>
         <p:spPr bwMode="auto">
           <a:xfrm>
-            <a:off x="5125879" y="4233447"/>
+            <a:off x="5128025" y="4260642"/>
             <a:ext cx="287258" cy="338554"/>
           </a:xfrm>
           <a:prstGeom prst="rect">
@@ -13012,10 +13143,10 @@
       </p:sp>
       <p:sp>
         <p:nvSpPr>
-          <p:cNvPr id="28" name="Text Box 18">
+          <p:cNvPr id="27" name="Text Box 18">
             <a:extLst>
               <a:ext uri="{FF2B5EF4-FFF2-40B4-BE49-F238E27FC236}">
-                <a16:creationId xmlns:a16="http://schemas.microsoft.com/office/drawing/2014/main" id="{5FFA4A74-DCBD-45DF-ABFA-2CE44241AD4B}"/>
+                <a16:creationId xmlns:a16="http://schemas.microsoft.com/office/drawing/2014/main" id="{A438A3DB-AFEE-4F9F-8E3A-DC8C6314EAC0}"/>
               </a:ext>
             </a:extLst>
           </p:cNvPr>
@@ -13026,7 +13157,7 @@
         </p:nvSpPr>
         <p:spPr bwMode="auto">
           <a:xfrm>
-            <a:off x="5125879" y="4783723"/>
+            <a:off x="5128025" y="4745038"/>
             <a:ext cx="287258" cy="338554"/>
           </a:xfrm>
           <a:prstGeom prst="rect">
@@ -13192,17 +13323,17 @@
             </a:pPr>
             <a:r>
               <a:rPr lang="en-US" sz="1600" dirty="0"/>
-              <a:t>2</a:t>
+              <a:t>1</a:t>
             </a:r>
           </a:p>
         </p:txBody>
       </p:sp>
       <p:sp>
         <p:nvSpPr>
-          <p:cNvPr id="29" name="Text Box 18">
+          <p:cNvPr id="28" name="Text Box 18">
             <a:extLst>
               <a:ext uri="{FF2B5EF4-FFF2-40B4-BE49-F238E27FC236}">
-                <a16:creationId xmlns:a16="http://schemas.microsoft.com/office/drawing/2014/main" id="{049E1FEE-ABA5-49F4-A050-9EAA674FD901}"/>
+                <a16:creationId xmlns:a16="http://schemas.microsoft.com/office/drawing/2014/main" id="{22929AE5-568F-4C09-B874-C8BFEEBE9289}"/>
               </a:ext>
             </a:extLst>
           </p:cNvPr>
@@ -13213,194 +13344,7 @@
         </p:nvSpPr>
         <p:spPr bwMode="auto">
           <a:xfrm>
-            <a:off x="5121887" y="5285374"/>
-            <a:ext cx="287258" cy="338554"/>
-          </a:xfrm>
-          <a:prstGeom prst="rect">
-            <a:avLst/>
-          </a:prstGeom>
-          <a:noFill/>
-          <a:ln>
-            <a:noFill/>
-          </a:ln>
-          <a:extLst>
-            <a:ext uri="{909E8E84-426E-40DD-AFC4-6F175D3DCCD1}">
-              <a14:hiddenFill xmlns:a14="http://schemas.microsoft.com/office/drawing/2010/main">
-                <a:solidFill>
-                  <a:srgbClr val="FFFFFF"/>
-                </a:solidFill>
-              </a14:hiddenFill>
-            </a:ext>
-            <a:ext uri="{91240B29-F687-4F45-9708-019B960494DF}">
-              <a14:hiddenLine xmlns:a14="http://schemas.microsoft.com/office/drawing/2010/main" w="9525">
-                <a:solidFill>
-                  <a:srgbClr val="000000"/>
-                </a:solidFill>
-                <a:miter lim="800000"/>
-                <a:headEnd/>
-                <a:tailEnd/>
-              </a14:hiddenLine>
-            </a:ext>
-          </a:extLst>
-        </p:spPr>
-        <p:txBody>
-          <a:bodyPr wrap="square">
-            <a:spAutoFit/>
-          </a:bodyPr>
-          <a:lstStyle>
-            <a:lvl1pPr>
-              <a:spcBef>
-                <a:spcPct val="20000"/>
-              </a:spcBef>
-              <a:buChar char="•"/>
-              <a:defRPr sz="3200">
-                <a:solidFill>
-                  <a:schemeClr val="tx1"/>
-                </a:solidFill>
-                <a:latin typeface="Times New Roman" panose="02020603050405020304" pitchFamily="18" charset="0"/>
-              </a:defRPr>
-            </a:lvl1pPr>
-            <a:lvl2pPr marL="742950" indent="-285750">
-              <a:spcBef>
-                <a:spcPct val="20000"/>
-              </a:spcBef>
-              <a:buChar char="–"/>
-              <a:defRPr sz="2800">
-                <a:solidFill>
-                  <a:schemeClr val="tx1"/>
-                </a:solidFill>
-                <a:latin typeface="Times New Roman" panose="02020603050405020304" pitchFamily="18" charset="0"/>
-              </a:defRPr>
-            </a:lvl2pPr>
-            <a:lvl3pPr marL="1143000" indent="-228600">
-              <a:spcBef>
-                <a:spcPct val="20000"/>
-              </a:spcBef>
-              <a:buChar char="•"/>
-              <a:defRPr sz="2400">
-                <a:solidFill>
-                  <a:schemeClr val="tx1"/>
-                </a:solidFill>
-                <a:latin typeface="Times New Roman" panose="02020603050405020304" pitchFamily="18" charset="0"/>
-              </a:defRPr>
-            </a:lvl3pPr>
-            <a:lvl4pPr marL="1600200" indent="-228600">
-              <a:spcBef>
-                <a:spcPct val="20000"/>
-              </a:spcBef>
-              <a:buChar char="–"/>
-              <a:defRPr sz="2000">
-                <a:solidFill>
-                  <a:schemeClr val="tx1"/>
-                </a:solidFill>
-                <a:latin typeface="Times New Roman" panose="02020603050405020304" pitchFamily="18" charset="0"/>
-              </a:defRPr>
-            </a:lvl4pPr>
-            <a:lvl5pPr marL="2057400" indent="-228600">
-              <a:spcBef>
-                <a:spcPct val="20000"/>
-              </a:spcBef>
-              <a:buChar char="»"/>
-              <a:defRPr sz="2000">
-                <a:solidFill>
-                  <a:schemeClr val="tx1"/>
-                </a:solidFill>
-                <a:latin typeface="Times New Roman" panose="02020603050405020304" pitchFamily="18" charset="0"/>
-              </a:defRPr>
-            </a:lvl5pPr>
-            <a:lvl6pPr marL="2514600" indent="-228600" eaLnBrk="0" fontAlgn="base" hangingPunct="0">
-              <a:spcBef>
-                <a:spcPct val="20000"/>
-              </a:spcBef>
-              <a:spcAft>
-                <a:spcPct val="0"/>
-              </a:spcAft>
-              <a:buChar char="»"/>
-              <a:defRPr sz="2000">
-                <a:solidFill>
-                  <a:schemeClr val="tx1"/>
-                </a:solidFill>
-                <a:latin typeface="Times New Roman" panose="02020603050405020304" pitchFamily="18" charset="0"/>
-              </a:defRPr>
-            </a:lvl6pPr>
-            <a:lvl7pPr marL="2971800" indent="-228600" eaLnBrk="0" fontAlgn="base" hangingPunct="0">
-              <a:spcBef>
-                <a:spcPct val="20000"/>
-              </a:spcBef>
-              <a:spcAft>
-                <a:spcPct val="0"/>
-              </a:spcAft>
-              <a:buChar char="»"/>
-              <a:defRPr sz="2000">
-                <a:solidFill>
-                  <a:schemeClr val="tx1"/>
-                </a:solidFill>
-                <a:latin typeface="Times New Roman" panose="02020603050405020304" pitchFamily="18" charset="0"/>
-              </a:defRPr>
-            </a:lvl7pPr>
-            <a:lvl8pPr marL="3429000" indent="-228600" eaLnBrk="0" fontAlgn="base" hangingPunct="0">
-              <a:spcBef>
-                <a:spcPct val="20000"/>
-              </a:spcBef>
-              <a:spcAft>
-                <a:spcPct val="0"/>
-              </a:spcAft>
-              <a:buChar char="»"/>
-              <a:defRPr sz="2000">
-                <a:solidFill>
-                  <a:schemeClr val="tx1"/>
-                </a:solidFill>
-                <a:latin typeface="Times New Roman" panose="02020603050405020304" pitchFamily="18" charset="0"/>
-              </a:defRPr>
-            </a:lvl8pPr>
-            <a:lvl9pPr marL="3886200" indent="-228600" eaLnBrk="0" fontAlgn="base" hangingPunct="0">
-              <a:spcBef>
-                <a:spcPct val="20000"/>
-              </a:spcBef>
-              <a:spcAft>
-                <a:spcPct val="0"/>
-              </a:spcAft>
-              <a:buChar char="»"/>
-              <a:defRPr sz="2000">
-                <a:solidFill>
-                  <a:schemeClr val="tx1"/>
-                </a:solidFill>
-                <a:latin typeface="Times New Roman" panose="02020603050405020304" pitchFamily="18" charset="0"/>
-              </a:defRPr>
-            </a:lvl9pPr>
-          </a:lstStyle>
-          <a:p>
-            <a:pPr>
-              <a:spcBef>
-                <a:spcPct val="0"/>
-              </a:spcBef>
-              <a:buFontTx/>
-              <a:buNone/>
-            </a:pPr>
-            <a:r>
-              <a:rPr lang="en-US" sz="1600" dirty="0"/>
-              <a:t>1</a:t>
-            </a:r>
-          </a:p>
-        </p:txBody>
-      </p:sp>
-      <p:sp>
-        <p:nvSpPr>
-          <p:cNvPr id="30" name="Text Box 18">
-            <a:extLst>
-              <a:ext uri="{FF2B5EF4-FFF2-40B4-BE49-F238E27FC236}">
-                <a16:creationId xmlns:a16="http://schemas.microsoft.com/office/drawing/2014/main" id="{18B3E0BF-3D5C-4F11-B63F-D4E339261023}"/>
-              </a:ext>
-            </a:extLst>
-          </p:cNvPr>
-          <p:cNvSpPr txBox="1">
-            <a:spLocks noChangeArrowheads="1"/>
-          </p:cNvSpPr>
-          <p:nvPr/>
-        </p:nvSpPr>
-        <p:spPr bwMode="auto">
-          <a:xfrm>
-            <a:off x="3674309" y="2772455"/>
+            <a:off x="5128025" y="5278437"/>
             <a:ext cx="287258" cy="338554"/>
           </a:xfrm>
           <a:prstGeom prst="rect">
@@ -13566,7 +13510,1129 @@
             </a:pPr>
             <a:r>
               <a:rPr lang="en-US" sz="1600" dirty="0"/>
-              <a:t>7</a:t>
+              <a:t>3</a:t>
+            </a:r>
+          </a:p>
+        </p:txBody>
+      </p:sp>
+      <p:sp>
+        <p:nvSpPr>
+          <p:cNvPr id="29" name="Text Box 18">
+            <a:extLst>
+              <a:ext uri="{FF2B5EF4-FFF2-40B4-BE49-F238E27FC236}">
+                <a16:creationId xmlns:a16="http://schemas.microsoft.com/office/drawing/2014/main" id="{D051F560-F687-4650-AD99-EECB0549DBDA}"/>
+              </a:ext>
+            </a:extLst>
+          </p:cNvPr>
+          <p:cNvSpPr txBox="1">
+            <a:spLocks noChangeArrowheads="1"/>
+          </p:cNvSpPr>
+          <p:nvPr/>
+        </p:nvSpPr>
+        <p:spPr bwMode="auto">
+          <a:xfrm>
+            <a:off x="3600529" y="2802523"/>
+            <a:ext cx="287258" cy="338554"/>
+          </a:xfrm>
+          <a:prstGeom prst="rect">
+            <a:avLst/>
+          </a:prstGeom>
+          <a:noFill/>
+          <a:ln>
+            <a:noFill/>
+          </a:ln>
+          <a:extLst>
+            <a:ext uri="{909E8E84-426E-40DD-AFC4-6F175D3DCCD1}">
+              <a14:hiddenFill xmlns:a14="http://schemas.microsoft.com/office/drawing/2010/main">
+                <a:solidFill>
+                  <a:srgbClr val="FFFFFF"/>
+                </a:solidFill>
+              </a14:hiddenFill>
+            </a:ext>
+            <a:ext uri="{91240B29-F687-4F45-9708-019B960494DF}">
+              <a14:hiddenLine xmlns:a14="http://schemas.microsoft.com/office/drawing/2010/main" w="9525">
+                <a:solidFill>
+                  <a:srgbClr val="000000"/>
+                </a:solidFill>
+                <a:miter lim="800000"/>
+                <a:headEnd/>
+                <a:tailEnd/>
+              </a14:hiddenLine>
+            </a:ext>
+          </a:extLst>
+        </p:spPr>
+        <p:txBody>
+          <a:bodyPr wrap="none">
+            <a:spAutoFit/>
+          </a:bodyPr>
+          <a:lstStyle>
+            <a:lvl1pPr>
+              <a:spcBef>
+                <a:spcPct val="20000"/>
+              </a:spcBef>
+              <a:buChar char="•"/>
+              <a:defRPr sz="3200">
+                <a:solidFill>
+                  <a:schemeClr val="tx1"/>
+                </a:solidFill>
+                <a:latin typeface="Times New Roman" panose="02020603050405020304" pitchFamily="18" charset="0"/>
+              </a:defRPr>
+            </a:lvl1pPr>
+            <a:lvl2pPr marL="742950" indent="-285750">
+              <a:spcBef>
+                <a:spcPct val="20000"/>
+              </a:spcBef>
+              <a:buChar char="–"/>
+              <a:defRPr sz="2800">
+                <a:solidFill>
+                  <a:schemeClr val="tx1"/>
+                </a:solidFill>
+                <a:latin typeface="Times New Roman" panose="02020603050405020304" pitchFamily="18" charset="0"/>
+              </a:defRPr>
+            </a:lvl2pPr>
+            <a:lvl3pPr marL="1143000" indent="-228600">
+              <a:spcBef>
+                <a:spcPct val="20000"/>
+              </a:spcBef>
+              <a:buChar char="•"/>
+              <a:defRPr sz="2400">
+                <a:solidFill>
+                  <a:schemeClr val="tx1"/>
+                </a:solidFill>
+                <a:latin typeface="Times New Roman" panose="02020603050405020304" pitchFamily="18" charset="0"/>
+              </a:defRPr>
+            </a:lvl3pPr>
+            <a:lvl4pPr marL="1600200" indent="-228600">
+              <a:spcBef>
+                <a:spcPct val="20000"/>
+              </a:spcBef>
+              <a:buChar char="–"/>
+              <a:defRPr sz="2000">
+                <a:solidFill>
+                  <a:schemeClr val="tx1"/>
+                </a:solidFill>
+                <a:latin typeface="Times New Roman" panose="02020603050405020304" pitchFamily="18" charset="0"/>
+              </a:defRPr>
+            </a:lvl4pPr>
+            <a:lvl5pPr marL="2057400" indent="-228600">
+              <a:spcBef>
+                <a:spcPct val="20000"/>
+              </a:spcBef>
+              <a:buChar char="»"/>
+              <a:defRPr sz="2000">
+                <a:solidFill>
+                  <a:schemeClr val="tx1"/>
+                </a:solidFill>
+                <a:latin typeface="Times New Roman" panose="02020603050405020304" pitchFamily="18" charset="0"/>
+              </a:defRPr>
+            </a:lvl5pPr>
+            <a:lvl6pPr marL="2514600" indent="-228600" eaLnBrk="0" fontAlgn="base" hangingPunct="0">
+              <a:spcBef>
+                <a:spcPct val="20000"/>
+              </a:spcBef>
+              <a:spcAft>
+                <a:spcPct val="0"/>
+              </a:spcAft>
+              <a:buChar char="»"/>
+              <a:defRPr sz="2000">
+                <a:solidFill>
+                  <a:schemeClr val="tx1"/>
+                </a:solidFill>
+                <a:latin typeface="Times New Roman" panose="02020603050405020304" pitchFamily="18" charset="0"/>
+              </a:defRPr>
+            </a:lvl6pPr>
+            <a:lvl7pPr marL="2971800" indent="-228600" eaLnBrk="0" fontAlgn="base" hangingPunct="0">
+              <a:spcBef>
+                <a:spcPct val="20000"/>
+              </a:spcBef>
+              <a:spcAft>
+                <a:spcPct val="0"/>
+              </a:spcAft>
+              <a:buChar char="»"/>
+              <a:defRPr sz="2000">
+                <a:solidFill>
+                  <a:schemeClr val="tx1"/>
+                </a:solidFill>
+                <a:latin typeface="Times New Roman" panose="02020603050405020304" pitchFamily="18" charset="0"/>
+              </a:defRPr>
+            </a:lvl7pPr>
+            <a:lvl8pPr marL="3429000" indent="-228600" eaLnBrk="0" fontAlgn="base" hangingPunct="0">
+              <a:spcBef>
+                <a:spcPct val="20000"/>
+              </a:spcBef>
+              <a:spcAft>
+                <a:spcPct val="0"/>
+              </a:spcAft>
+              <a:buChar char="»"/>
+              <a:defRPr sz="2000">
+                <a:solidFill>
+                  <a:schemeClr val="tx1"/>
+                </a:solidFill>
+                <a:latin typeface="Times New Roman" panose="02020603050405020304" pitchFamily="18" charset="0"/>
+              </a:defRPr>
+            </a:lvl8pPr>
+            <a:lvl9pPr marL="3886200" indent="-228600" eaLnBrk="0" fontAlgn="base" hangingPunct="0">
+              <a:spcBef>
+                <a:spcPct val="20000"/>
+              </a:spcBef>
+              <a:spcAft>
+                <a:spcPct val="0"/>
+              </a:spcAft>
+              <a:buChar char="»"/>
+              <a:defRPr sz="2000">
+                <a:solidFill>
+                  <a:schemeClr val="tx1"/>
+                </a:solidFill>
+                <a:latin typeface="Times New Roman" panose="02020603050405020304" pitchFamily="18" charset="0"/>
+              </a:defRPr>
+            </a:lvl9pPr>
+          </a:lstStyle>
+          <a:p>
+            <a:pPr>
+              <a:spcBef>
+                <a:spcPct val="0"/>
+              </a:spcBef>
+              <a:buFontTx/>
+              <a:buNone/>
+            </a:pPr>
+            <a:r>
+              <a:rPr lang="en-US" sz="1600" dirty="0"/>
+              <a:t>1</a:t>
+            </a:r>
+          </a:p>
+        </p:txBody>
+      </p:sp>
+      <p:sp>
+        <p:nvSpPr>
+          <p:cNvPr id="30" name="Text Box 18">
+            <a:extLst>
+              <a:ext uri="{FF2B5EF4-FFF2-40B4-BE49-F238E27FC236}">
+                <a16:creationId xmlns:a16="http://schemas.microsoft.com/office/drawing/2014/main" id="{8523B996-C749-42B7-94D6-6021DBA341A9}"/>
+              </a:ext>
+            </a:extLst>
+          </p:cNvPr>
+          <p:cNvSpPr txBox="1">
+            <a:spLocks noChangeArrowheads="1"/>
+          </p:cNvSpPr>
+          <p:nvPr/>
+        </p:nvSpPr>
+        <p:spPr bwMode="auto">
+          <a:xfrm>
+            <a:off x="3600529" y="3255432"/>
+            <a:ext cx="287258" cy="338554"/>
+          </a:xfrm>
+          <a:prstGeom prst="rect">
+            <a:avLst/>
+          </a:prstGeom>
+          <a:noFill/>
+          <a:ln>
+            <a:noFill/>
+          </a:ln>
+          <a:extLst>
+            <a:ext uri="{909E8E84-426E-40DD-AFC4-6F175D3DCCD1}">
+              <a14:hiddenFill xmlns:a14="http://schemas.microsoft.com/office/drawing/2010/main">
+                <a:solidFill>
+                  <a:srgbClr val="FFFFFF"/>
+                </a:solidFill>
+              </a14:hiddenFill>
+            </a:ext>
+            <a:ext uri="{91240B29-F687-4F45-9708-019B960494DF}">
+              <a14:hiddenLine xmlns:a14="http://schemas.microsoft.com/office/drawing/2010/main" w="9525">
+                <a:solidFill>
+                  <a:srgbClr val="000000"/>
+                </a:solidFill>
+                <a:miter lim="800000"/>
+                <a:headEnd/>
+                <a:tailEnd/>
+              </a14:hiddenLine>
+            </a:ext>
+          </a:extLst>
+        </p:spPr>
+        <p:txBody>
+          <a:bodyPr wrap="none">
+            <a:spAutoFit/>
+          </a:bodyPr>
+          <a:lstStyle>
+            <a:lvl1pPr>
+              <a:spcBef>
+                <a:spcPct val="20000"/>
+              </a:spcBef>
+              <a:buChar char="•"/>
+              <a:defRPr sz="3200">
+                <a:solidFill>
+                  <a:schemeClr val="tx1"/>
+                </a:solidFill>
+                <a:latin typeface="Times New Roman" panose="02020603050405020304" pitchFamily="18" charset="0"/>
+              </a:defRPr>
+            </a:lvl1pPr>
+            <a:lvl2pPr marL="742950" indent="-285750">
+              <a:spcBef>
+                <a:spcPct val="20000"/>
+              </a:spcBef>
+              <a:buChar char="–"/>
+              <a:defRPr sz="2800">
+                <a:solidFill>
+                  <a:schemeClr val="tx1"/>
+                </a:solidFill>
+                <a:latin typeface="Times New Roman" panose="02020603050405020304" pitchFamily="18" charset="0"/>
+              </a:defRPr>
+            </a:lvl2pPr>
+            <a:lvl3pPr marL="1143000" indent="-228600">
+              <a:spcBef>
+                <a:spcPct val="20000"/>
+              </a:spcBef>
+              <a:buChar char="•"/>
+              <a:defRPr sz="2400">
+                <a:solidFill>
+                  <a:schemeClr val="tx1"/>
+                </a:solidFill>
+                <a:latin typeface="Times New Roman" panose="02020603050405020304" pitchFamily="18" charset="0"/>
+              </a:defRPr>
+            </a:lvl3pPr>
+            <a:lvl4pPr marL="1600200" indent="-228600">
+              <a:spcBef>
+                <a:spcPct val="20000"/>
+              </a:spcBef>
+              <a:buChar char="–"/>
+              <a:defRPr sz="2000">
+                <a:solidFill>
+                  <a:schemeClr val="tx1"/>
+                </a:solidFill>
+                <a:latin typeface="Times New Roman" panose="02020603050405020304" pitchFamily="18" charset="0"/>
+              </a:defRPr>
+            </a:lvl4pPr>
+            <a:lvl5pPr marL="2057400" indent="-228600">
+              <a:spcBef>
+                <a:spcPct val="20000"/>
+              </a:spcBef>
+              <a:buChar char="»"/>
+              <a:defRPr sz="2000">
+                <a:solidFill>
+                  <a:schemeClr val="tx1"/>
+                </a:solidFill>
+                <a:latin typeface="Times New Roman" panose="02020603050405020304" pitchFamily="18" charset="0"/>
+              </a:defRPr>
+            </a:lvl5pPr>
+            <a:lvl6pPr marL="2514600" indent="-228600" eaLnBrk="0" fontAlgn="base" hangingPunct="0">
+              <a:spcBef>
+                <a:spcPct val="20000"/>
+              </a:spcBef>
+              <a:spcAft>
+                <a:spcPct val="0"/>
+              </a:spcAft>
+              <a:buChar char="»"/>
+              <a:defRPr sz="2000">
+                <a:solidFill>
+                  <a:schemeClr val="tx1"/>
+                </a:solidFill>
+                <a:latin typeface="Times New Roman" panose="02020603050405020304" pitchFamily="18" charset="0"/>
+              </a:defRPr>
+            </a:lvl6pPr>
+            <a:lvl7pPr marL="2971800" indent="-228600" eaLnBrk="0" fontAlgn="base" hangingPunct="0">
+              <a:spcBef>
+                <a:spcPct val="20000"/>
+              </a:spcBef>
+              <a:spcAft>
+                <a:spcPct val="0"/>
+              </a:spcAft>
+              <a:buChar char="»"/>
+              <a:defRPr sz="2000">
+                <a:solidFill>
+                  <a:schemeClr val="tx1"/>
+                </a:solidFill>
+                <a:latin typeface="Times New Roman" panose="02020603050405020304" pitchFamily="18" charset="0"/>
+              </a:defRPr>
+            </a:lvl7pPr>
+            <a:lvl8pPr marL="3429000" indent="-228600" eaLnBrk="0" fontAlgn="base" hangingPunct="0">
+              <a:spcBef>
+                <a:spcPct val="20000"/>
+              </a:spcBef>
+              <a:spcAft>
+                <a:spcPct val="0"/>
+              </a:spcAft>
+              <a:buChar char="»"/>
+              <a:defRPr sz="2000">
+                <a:solidFill>
+                  <a:schemeClr val="tx1"/>
+                </a:solidFill>
+                <a:latin typeface="Times New Roman" panose="02020603050405020304" pitchFamily="18" charset="0"/>
+              </a:defRPr>
+            </a:lvl8pPr>
+            <a:lvl9pPr marL="3886200" indent="-228600" eaLnBrk="0" fontAlgn="base" hangingPunct="0">
+              <a:spcBef>
+                <a:spcPct val="20000"/>
+              </a:spcBef>
+              <a:spcAft>
+                <a:spcPct val="0"/>
+              </a:spcAft>
+              <a:buChar char="»"/>
+              <a:defRPr sz="2000">
+                <a:solidFill>
+                  <a:schemeClr val="tx1"/>
+                </a:solidFill>
+                <a:latin typeface="Times New Roman" panose="02020603050405020304" pitchFamily="18" charset="0"/>
+              </a:defRPr>
+            </a:lvl9pPr>
+          </a:lstStyle>
+          <a:p>
+            <a:pPr>
+              <a:spcBef>
+                <a:spcPct val="0"/>
+              </a:spcBef>
+              <a:buFontTx/>
+              <a:buNone/>
+            </a:pPr>
+            <a:r>
+              <a:rPr lang="en-US" sz="1600" dirty="0"/>
+              <a:t>3</a:t>
+            </a:r>
+          </a:p>
+        </p:txBody>
+      </p:sp>
+      <p:sp>
+        <p:nvSpPr>
+          <p:cNvPr id="31" name="Text Box 18">
+            <a:extLst>
+              <a:ext uri="{FF2B5EF4-FFF2-40B4-BE49-F238E27FC236}">
+                <a16:creationId xmlns:a16="http://schemas.microsoft.com/office/drawing/2014/main" id="{C25D546F-189E-47A7-B40F-67B097CBAEB6}"/>
+              </a:ext>
+            </a:extLst>
+          </p:cNvPr>
+          <p:cNvSpPr txBox="1">
+            <a:spLocks noChangeArrowheads="1"/>
+          </p:cNvSpPr>
+          <p:nvPr/>
+        </p:nvSpPr>
+        <p:spPr bwMode="auto">
+          <a:xfrm>
+            <a:off x="3600529" y="3735897"/>
+            <a:ext cx="287258" cy="338554"/>
+          </a:xfrm>
+          <a:prstGeom prst="rect">
+            <a:avLst/>
+          </a:prstGeom>
+          <a:noFill/>
+          <a:ln>
+            <a:noFill/>
+          </a:ln>
+          <a:extLst>
+            <a:ext uri="{909E8E84-426E-40DD-AFC4-6F175D3DCCD1}">
+              <a14:hiddenFill xmlns:a14="http://schemas.microsoft.com/office/drawing/2010/main">
+                <a:solidFill>
+                  <a:srgbClr val="FFFFFF"/>
+                </a:solidFill>
+              </a14:hiddenFill>
+            </a:ext>
+            <a:ext uri="{91240B29-F687-4F45-9708-019B960494DF}">
+              <a14:hiddenLine xmlns:a14="http://schemas.microsoft.com/office/drawing/2010/main" w="9525">
+                <a:solidFill>
+                  <a:srgbClr val="000000"/>
+                </a:solidFill>
+                <a:miter lim="800000"/>
+                <a:headEnd/>
+                <a:tailEnd/>
+              </a14:hiddenLine>
+            </a:ext>
+          </a:extLst>
+        </p:spPr>
+        <p:txBody>
+          <a:bodyPr wrap="none">
+            <a:spAutoFit/>
+          </a:bodyPr>
+          <a:lstStyle>
+            <a:lvl1pPr>
+              <a:spcBef>
+                <a:spcPct val="20000"/>
+              </a:spcBef>
+              <a:buChar char="•"/>
+              <a:defRPr sz="3200">
+                <a:solidFill>
+                  <a:schemeClr val="tx1"/>
+                </a:solidFill>
+                <a:latin typeface="Times New Roman" panose="02020603050405020304" pitchFamily="18" charset="0"/>
+              </a:defRPr>
+            </a:lvl1pPr>
+            <a:lvl2pPr marL="742950" indent="-285750">
+              <a:spcBef>
+                <a:spcPct val="20000"/>
+              </a:spcBef>
+              <a:buChar char="–"/>
+              <a:defRPr sz="2800">
+                <a:solidFill>
+                  <a:schemeClr val="tx1"/>
+                </a:solidFill>
+                <a:latin typeface="Times New Roman" panose="02020603050405020304" pitchFamily="18" charset="0"/>
+              </a:defRPr>
+            </a:lvl2pPr>
+            <a:lvl3pPr marL="1143000" indent="-228600">
+              <a:spcBef>
+                <a:spcPct val="20000"/>
+              </a:spcBef>
+              <a:buChar char="•"/>
+              <a:defRPr sz="2400">
+                <a:solidFill>
+                  <a:schemeClr val="tx1"/>
+                </a:solidFill>
+                <a:latin typeface="Times New Roman" panose="02020603050405020304" pitchFamily="18" charset="0"/>
+              </a:defRPr>
+            </a:lvl3pPr>
+            <a:lvl4pPr marL="1600200" indent="-228600">
+              <a:spcBef>
+                <a:spcPct val="20000"/>
+              </a:spcBef>
+              <a:buChar char="–"/>
+              <a:defRPr sz="2000">
+                <a:solidFill>
+                  <a:schemeClr val="tx1"/>
+                </a:solidFill>
+                <a:latin typeface="Times New Roman" panose="02020603050405020304" pitchFamily="18" charset="0"/>
+              </a:defRPr>
+            </a:lvl4pPr>
+            <a:lvl5pPr marL="2057400" indent="-228600">
+              <a:spcBef>
+                <a:spcPct val="20000"/>
+              </a:spcBef>
+              <a:buChar char="»"/>
+              <a:defRPr sz="2000">
+                <a:solidFill>
+                  <a:schemeClr val="tx1"/>
+                </a:solidFill>
+                <a:latin typeface="Times New Roman" panose="02020603050405020304" pitchFamily="18" charset="0"/>
+              </a:defRPr>
+            </a:lvl5pPr>
+            <a:lvl6pPr marL="2514600" indent="-228600" eaLnBrk="0" fontAlgn="base" hangingPunct="0">
+              <a:spcBef>
+                <a:spcPct val="20000"/>
+              </a:spcBef>
+              <a:spcAft>
+                <a:spcPct val="0"/>
+              </a:spcAft>
+              <a:buChar char="»"/>
+              <a:defRPr sz="2000">
+                <a:solidFill>
+                  <a:schemeClr val="tx1"/>
+                </a:solidFill>
+                <a:latin typeface="Times New Roman" panose="02020603050405020304" pitchFamily="18" charset="0"/>
+              </a:defRPr>
+            </a:lvl6pPr>
+            <a:lvl7pPr marL="2971800" indent="-228600" eaLnBrk="0" fontAlgn="base" hangingPunct="0">
+              <a:spcBef>
+                <a:spcPct val="20000"/>
+              </a:spcBef>
+              <a:spcAft>
+                <a:spcPct val="0"/>
+              </a:spcAft>
+              <a:buChar char="»"/>
+              <a:defRPr sz="2000">
+                <a:solidFill>
+                  <a:schemeClr val="tx1"/>
+                </a:solidFill>
+                <a:latin typeface="Times New Roman" panose="02020603050405020304" pitchFamily="18" charset="0"/>
+              </a:defRPr>
+            </a:lvl7pPr>
+            <a:lvl8pPr marL="3429000" indent="-228600" eaLnBrk="0" fontAlgn="base" hangingPunct="0">
+              <a:spcBef>
+                <a:spcPct val="20000"/>
+              </a:spcBef>
+              <a:spcAft>
+                <a:spcPct val="0"/>
+              </a:spcAft>
+              <a:buChar char="»"/>
+              <a:defRPr sz="2000">
+                <a:solidFill>
+                  <a:schemeClr val="tx1"/>
+                </a:solidFill>
+                <a:latin typeface="Times New Roman" panose="02020603050405020304" pitchFamily="18" charset="0"/>
+              </a:defRPr>
+            </a:lvl8pPr>
+            <a:lvl9pPr marL="3886200" indent="-228600" eaLnBrk="0" fontAlgn="base" hangingPunct="0">
+              <a:spcBef>
+                <a:spcPct val="20000"/>
+              </a:spcBef>
+              <a:spcAft>
+                <a:spcPct val="0"/>
+              </a:spcAft>
+              <a:buChar char="»"/>
+              <a:defRPr sz="2000">
+                <a:solidFill>
+                  <a:schemeClr val="tx1"/>
+                </a:solidFill>
+                <a:latin typeface="Times New Roman" panose="02020603050405020304" pitchFamily="18" charset="0"/>
+              </a:defRPr>
+            </a:lvl9pPr>
+          </a:lstStyle>
+          <a:p>
+            <a:pPr>
+              <a:spcBef>
+                <a:spcPct val="0"/>
+              </a:spcBef>
+              <a:buFontTx/>
+              <a:buNone/>
+            </a:pPr>
+            <a:r>
+              <a:rPr lang="en-US" sz="1600" dirty="0"/>
+              <a:t>2</a:t>
+            </a:r>
+          </a:p>
+        </p:txBody>
+      </p:sp>
+      <p:sp>
+        <p:nvSpPr>
+          <p:cNvPr id="32" name="Text Box 18">
+            <a:extLst>
+              <a:ext uri="{FF2B5EF4-FFF2-40B4-BE49-F238E27FC236}">
+                <a16:creationId xmlns:a16="http://schemas.microsoft.com/office/drawing/2014/main" id="{552C4F4E-B12C-481F-B7E9-EA0AB080A97D}"/>
+              </a:ext>
+            </a:extLst>
+          </p:cNvPr>
+          <p:cNvSpPr txBox="1">
+            <a:spLocks noChangeArrowheads="1"/>
+          </p:cNvSpPr>
+          <p:nvPr/>
+        </p:nvSpPr>
+        <p:spPr bwMode="auto">
+          <a:xfrm>
+            <a:off x="3600529" y="4220616"/>
+            <a:ext cx="287258" cy="338554"/>
+          </a:xfrm>
+          <a:prstGeom prst="rect">
+            <a:avLst/>
+          </a:prstGeom>
+          <a:noFill/>
+          <a:ln>
+            <a:noFill/>
+          </a:ln>
+          <a:extLst>
+            <a:ext uri="{909E8E84-426E-40DD-AFC4-6F175D3DCCD1}">
+              <a14:hiddenFill xmlns:a14="http://schemas.microsoft.com/office/drawing/2010/main">
+                <a:solidFill>
+                  <a:srgbClr val="FFFFFF"/>
+                </a:solidFill>
+              </a14:hiddenFill>
+            </a:ext>
+            <a:ext uri="{91240B29-F687-4F45-9708-019B960494DF}">
+              <a14:hiddenLine xmlns:a14="http://schemas.microsoft.com/office/drawing/2010/main" w="9525">
+                <a:solidFill>
+                  <a:srgbClr val="000000"/>
+                </a:solidFill>
+                <a:miter lim="800000"/>
+                <a:headEnd/>
+                <a:tailEnd/>
+              </a14:hiddenLine>
+            </a:ext>
+          </a:extLst>
+        </p:spPr>
+        <p:txBody>
+          <a:bodyPr wrap="none">
+            <a:spAutoFit/>
+          </a:bodyPr>
+          <a:lstStyle>
+            <a:lvl1pPr>
+              <a:spcBef>
+                <a:spcPct val="20000"/>
+              </a:spcBef>
+              <a:buChar char="•"/>
+              <a:defRPr sz="3200">
+                <a:solidFill>
+                  <a:schemeClr val="tx1"/>
+                </a:solidFill>
+                <a:latin typeface="Times New Roman" panose="02020603050405020304" pitchFamily="18" charset="0"/>
+              </a:defRPr>
+            </a:lvl1pPr>
+            <a:lvl2pPr marL="742950" indent="-285750">
+              <a:spcBef>
+                <a:spcPct val="20000"/>
+              </a:spcBef>
+              <a:buChar char="–"/>
+              <a:defRPr sz="2800">
+                <a:solidFill>
+                  <a:schemeClr val="tx1"/>
+                </a:solidFill>
+                <a:latin typeface="Times New Roman" panose="02020603050405020304" pitchFamily="18" charset="0"/>
+              </a:defRPr>
+            </a:lvl2pPr>
+            <a:lvl3pPr marL="1143000" indent="-228600">
+              <a:spcBef>
+                <a:spcPct val="20000"/>
+              </a:spcBef>
+              <a:buChar char="•"/>
+              <a:defRPr sz="2400">
+                <a:solidFill>
+                  <a:schemeClr val="tx1"/>
+                </a:solidFill>
+                <a:latin typeface="Times New Roman" panose="02020603050405020304" pitchFamily="18" charset="0"/>
+              </a:defRPr>
+            </a:lvl3pPr>
+            <a:lvl4pPr marL="1600200" indent="-228600">
+              <a:spcBef>
+                <a:spcPct val="20000"/>
+              </a:spcBef>
+              <a:buChar char="–"/>
+              <a:defRPr sz="2000">
+                <a:solidFill>
+                  <a:schemeClr val="tx1"/>
+                </a:solidFill>
+                <a:latin typeface="Times New Roman" panose="02020603050405020304" pitchFamily="18" charset="0"/>
+              </a:defRPr>
+            </a:lvl4pPr>
+            <a:lvl5pPr marL="2057400" indent="-228600">
+              <a:spcBef>
+                <a:spcPct val="20000"/>
+              </a:spcBef>
+              <a:buChar char="»"/>
+              <a:defRPr sz="2000">
+                <a:solidFill>
+                  <a:schemeClr val="tx1"/>
+                </a:solidFill>
+                <a:latin typeface="Times New Roman" panose="02020603050405020304" pitchFamily="18" charset="0"/>
+              </a:defRPr>
+            </a:lvl5pPr>
+            <a:lvl6pPr marL="2514600" indent="-228600" eaLnBrk="0" fontAlgn="base" hangingPunct="0">
+              <a:spcBef>
+                <a:spcPct val="20000"/>
+              </a:spcBef>
+              <a:spcAft>
+                <a:spcPct val="0"/>
+              </a:spcAft>
+              <a:buChar char="»"/>
+              <a:defRPr sz="2000">
+                <a:solidFill>
+                  <a:schemeClr val="tx1"/>
+                </a:solidFill>
+                <a:latin typeface="Times New Roman" panose="02020603050405020304" pitchFamily="18" charset="0"/>
+              </a:defRPr>
+            </a:lvl6pPr>
+            <a:lvl7pPr marL="2971800" indent="-228600" eaLnBrk="0" fontAlgn="base" hangingPunct="0">
+              <a:spcBef>
+                <a:spcPct val="20000"/>
+              </a:spcBef>
+              <a:spcAft>
+                <a:spcPct val="0"/>
+              </a:spcAft>
+              <a:buChar char="»"/>
+              <a:defRPr sz="2000">
+                <a:solidFill>
+                  <a:schemeClr val="tx1"/>
+                </a:solidFill>
+                <a:latin typeface="Times New Roman" panose="02020603050405020304" pitchFamily="18" charset="0"/>
+              </a:defRPr>
+            </a:lvl7pPr>
+            <a:lvl8pPr marL="3429000" indent="-228600" eaLnBrk="0" fontAlgn="base" hangingPunct="0">
+              <a:spcBef>
+                <a:spcPct val="20000"/>
+              </a:spcBef>
+              <a:spcAft>
+                <a:spcPct val="0"/>
+              </a:spcAft>
+              <a:buChar char="»"/>
+              <a:defRPr sz="2000">
+                <a:solidFill>
+                  <a:schemeClr val="tx1"/>
+                </a:solidFill>
+                <a:latin typeface="Times New Roman" panose="02020603050405020304" pitchFamily="18" charset="0"/>
+              </a:defRPr>
+            </a:lvl8pPr>
+            <a:lvl9pPr marL="3886200" indent="-228600" eaLnBrk="0" fontAlgn="base" hangingPunct="0">
+              <a:spcBef>
+                <a:spcPct val="20000"/>
+              </a:spcBef>
+              <a:spcAft>
+                <a:spcPct val="0"/>
+              </a:spcAft>
+              <a:buChar char="»"/>
+              <a:defRPr sz="2000">
+                <a:solidFill>
+                  <a:schemeClr val="tx1"/>
+                </a:solidFill>
+                <a:latin typeface="Times New Roman" panose="02020603050405020304" pitchFamily="18" charset="0"/>
+              </a:defRPr>
+            </a:lvl9pPr>
+          </a:lstStyle>
+          <a:p>
+            <a:pPr>
+              <a:spcBef>
+                <a:spcPct val="0"/>
+              </a:spcBef>
+              <a:buFontTx/>
+              <a:buNone/>
+            </a:pPr>
+            <a:r>
+              <a:rPr lang="en-US" sz="1600" dirty="0"/>
+              <a:t>4</a:t>
+            </a:r>
+          </a:p>
+        </p:txBody>
+      </p:sp>
+      <p:sp>
+        <p:nvSpPr>
+          <p:cNvPr id="33" name="Text Box 18">
+            <a:extLst>
+              <a:ext uri="{FF2B5EF4-FFF2-40B4-BE49-F238E27FC236}">
+                <a16:creationId xmlns:a16="http://schemas.microsoft.com/office/drawing/2014/main" id="{AC7832D6-91F2-49A3-A8BA-F41398FBDB11}"/>
+              </a:ext>
+            </a:extLst>
+          </p:cNvPr>
+          <p:cNvSpPr txBox="1">
+            <a:spLocks noChangeArrowheads="1"/>
+          </p:cNvSpPr>
+          <p:nvPr/>
+        </p:nvSpPr>
+        <p:spPr bwMode="auto">
+          <a:xfrm>
+            <a:off x="3600529" y="4711624"/>
+            <a:ext cx="287258" cy="338554"/>
+          </a:xfrm>
+          <a:prstGeom prst="rect">
+            <a:avLst/>
+          </a:prstGeom>
+          <a:noFill/>
+          <a:ln>
+            <a:noFill/>
+          </a:ln>
+          <a:extLst>
+            <a:ext uri="{909E8E84-426E-40DD-AFC4-6F175D3DCCD1}">
+              <a14:hiddenFill xmlns:a14="http://schemas.microsoft.com/office/drawing/2010/main">
+                <a:solidFill>
+                  <a:srgbClr val="FFFFFF"/>
+                </a:solidFill>
+              </a14:hiddenFill>
+            </a:ext>
+            <a:ext uri="{91240B29-F687-4F45-9708-019B960494DF}">
+              <a14:hiddenLine xmlns:a14="http://schemas.microsoft.com/office/drawing/2010/main" w="9525">
+                <a:solidFill>
+                  <a:srgbClr val="000000"/>
+                </a:solidFill>
+                <a:miter lim="800000"/>
+                <a:headEnd/>
+                <a:tailEnd/>
+              </a14:hiddenLine>
+            </a:ext>
+          </a:extLst>
+        </p:spPr>
+        <p:txBody>
+          <a:bodyPr wrap="none">
+            <a:spAutoFit/>
+          </a:bodyPr>
+          <a:lstStyle>
+            <a:lvl1pPr>
+              <a:spcBef>
+                <a:spcPct val="20000"/>
+              </a:spcBef>
+              <a:buChar char="•"/>
+              <a:defRPr sz="3200">
+                <a:solidFill>
+                  <a:schemeClr val="tx1"/>
+                </a:solidFill>
+                <a:latin typeface="Times New Roman" panose="02020603050405020304" pitchFamily="18" charset="0"/>
+              </a:defRPr>
+            </a:lvl1pPr>
+            <a:lvl2pPr marL="742950" indent="-285750">
+              <a:spcBef>
+                <a:spcPct val="20000"/>
+              </a:spcBef>
+              <a:buChar char="–"/>
+              <a:defRPr sz="2800">
+                <a:solidFill>
+                  <a:schemeClr val="tx1"/>
+                </a:solidFill>
+                <a:latin typeface="Times New Roman" panose="02020603050405020304" pitchFamily="18" charset="0"/>
+              </a:defRPr>
+            </a:lvl2pPr>
+            <a:lvl3pPr marL="1143000" indent="-228600">
+              <a:spcBef>
+                <a:spcPct val="20000"/>
+              </a:spcBef>
+              <a:buChar char="•"/>
+              <a:defRPr sz="2400">
+                <a:solidFill>
+                  <a:schemeClr val="tx1"/>
+                </a:solidFill>
+                <a:latin typeface="Times New Roman" panose="02020603050405020304" pitchFamily="18" charset="0"/>
+              </a:defRPr>
+            </a:lvl3pPr>
+            <a:lvl4pPr marL="1600200" indent="-228600">
+              <a:spcBef>
+                <a:spcPct val="20000"/>
+              </a:spcBef>
+              <a:buChar char="–"/>
+              <a:defRPr sz="2000">
+                <a:solidFill>
+                  <a:schemeClr val="tx1"/>
+                </a:solidFill>
+                <a:latin typeface="Times New Roman" panose="02020603050405020304" pitchFamily="18" charset="0"/>
+              </a:defRPr>
+            </a:lvl4pPr>
+            <a:lvl5pPr marL="2057400" indent="-228600">
+              <a:spcBef>
+                <a:spcPct val="20000"/>
+              </a:spcBef>
+              <a:buChar char="»"/>
+              <a:defRPr sz="2000">
+                <a:solidFill>
+                  <a:schemeClr val="tx1"/>
+                </a:solidFill>
+                <a:latin typeface="Times New Roman" panose="02020603050405020304" pitchFamily="18" charset="0"/>
+              </a:defRPr>
+            </a:lvl5pPr>
+            <a:lvl6pPr marL="2514600" indent="-228600" eaLnBrk="0" fontAlgn="base" hangingPunct="0">
+              <a:spcBef>
+                <a:spcPct val="20000"/>
+              </a:spcBef>
+              <a:spcAft>
+                <a:spcPct val="0"/>
+              </a:spcAft>
+              <a:buChar char="»"/>
+              <a:defRPr sz="2000">
+                <a:solidFill>
+                  <a:schemeClr val="tx1"/>
+                </a:solidFill>
+                <a:latin typeface="Times New Roman" panose="02020603050405020304" pitchFamily="18" charset="0"/>
+              </a:defRPr>
+            </a:lvl6pPr>
+            <a:lvl7pPr marL="2971800" indent="-228600" eaLnBrk="0" fontAlgn="base" hangingPunct="0">
+              <a:spcBef>
+                <a:spcPct val="20000"/>
+              </a:spcBef>
+              <a:spcAft>
+                <a:spcPct val="0"/>
+              </a:spcAft>
+              <a:buChar char="»"/>
+              <a:defRPr sz="2000">
+                <a:solidFill>
+                  <a:schemeClr val="tx1"/>
+                </a:solidFill>
+                <a:latin typeface="Times New Roman" panose="02020603050405020304" pitchFamily="18" charset="0"/>
+              </a:defRPr>
+            </a:lvl7pPr>
+            <a:lvl8pPr marL="3429000" indent="-228600" eaLnBrk="0" fontAlgn="base" hangingPunct="0">
+              <a:spcBef>
+                <a:spcPct val="20000"/>
+              </a:spcBef>
+              <a:spcAft>
+                <a:spcPct val="0"/>
+              </a:spcAft>
+              <a:buChar char="»"/>
+              <a:defRPr sz="2000">
+                <a:solidFill>
+                  <a:schemeClr val="tx1"/>
+                </a:solidFill>
+                <a:latin typeface="Times New Roman" panose="02020603050405020304" pitchFamily="18" charset="0"/>
+              </a:defRPr>
+            </a:lvl8pPr>
+            <a:lvl9pPr marL="3886200" indent="-228600" eaLnBrk="0" fontAlgn="base" hangingPunct="0">
+              <a:spcBef>
+                <a:spcPct val="20000"/>
+              </a:spcBef>
+              <a:spcAft>
+                <a:spcPct val="0"/>
+              </a:spcAft>
+              <a:buChar char="»"/>
+              <a:defRPr sz="2000">
+                <a:solidFill>
+                  <a:schemeClr val="tx1"/>
+                </a:solidFill>
+                <a:latin typeface="Times New Roman" panose="02020603050405020304" pitchFamily="18" charset="0"/>
+              </a:defRPr>
+            </a:lvl9pPr>
+          </a:lstStyle>
+          <a:p>
+            <a:pPr>
+              <a:spcBef>
+                <a:spcPct val="0"/>
+              </a:spcBef>
+              <a:buFontTx/>
+              <a:buNone/>
+            </a:pPr>
+            <a:r>
+              <a:rPr lang="en-US" sz="1600" dirty="0"/>
+              <a:t>1</a:t>
+            </a:r>
+          </a:p>
+        </p:txBody>
+      </p:sp>
+      <p:sp>
+        <p:nvSpPr>
+          <p:cNvPr id="34" name="Text Box 18">
+            <a:extLst>
+              <a:ext uri="{FF2B5EF4-FFF2-40B4-BE49-F238E27FC236}">
+                <a16:creationId xmlns:a16="http://schemas.microsoft.com/office/drawing/2014/main" id="{408EAEAA-6C63-469F-9BF6-1F125ACCC48A}"/>
+              </a:ext>
+            </a:extLst>
+          </p:cNvPr>
+          <p:cNvSpPr txBox="1">
+            <a:spLocks noChangeArrowheads="1"/>
+          </p:cNvSpPr>
+          <p:nvPr/>
+        </p:nvSpPr>
+        <p:spPr bwMode="auto">
+          <a:xfrm>
+            <a:off x="3600529" y="5310885"/>
+            <a:ext cx="287258" cy="338554"/>
+          </a:xfrm>
+          <a:prstGeom prst="rect">
+            <a:avLst/>
+          </a:prstGeom>
+          <a:noFill/>
+          <a:ln>
+            <a:noFill/>
+          </a:ln>
+          <a:extLst>
+            <a:ext uri="{909E8E84-426E-40DD-AFC4-6F175D3DCCD1}">
+              <a14:hiddenFill xmlns:a14="http://schemas.microsoft.com/office/drawing/2010/main">
+                <a:solidFill>
+                  <a:srgbClr val="FFFFFF"/>
+                </a:solidFill>
+              </a14:hiddenFill>
+            </a:ext>
+            <a:ext uri="{91240B29-F687-4F45-9708-019B960494DF}">
+              <a14:hiddenLine xmlns:a14="http://schemas.microsoft.com/office/drawing/2010/main" w="9525">
+                <a:solidFill>
+                  <a:srgbClr val="000000"/>
+                </a:solidFill>
+                <a:miter lim="800000"/>
+                <a:headEnd/>
+                <a:tailEnd/>
+              </a14:hiddenLine>
+            </a:ext>
+          </a:extLst>
+        </p:spPr>
+        <p:txBody>
+          <a:bodyPr wrap="none">
+            <a:spAutoFit/>
+          </a:bodyPr>
+          <a:lstStyle>
+            <a:lvl1pPr>
+              <a:spcBef>
+                <a:spcPct val="20000"/>
+              </a:spcBef>
+              <a:buChar char="•"/>
+              <a:defRPr sz="3200">
+                <a:solidFill>
+                  <a:schemeClr val="tx1"/>
+                </a:solidFill>
+                <a:latin typeface="Times New Roman" panose="02020603050405020304" pitchFamily="18" charset="0"/>
+              </a:defRPr>
+            </a:lvl1pPr>
+            <a:lvl2pPr marL="742950" indent="-285750">
+              <a:spcBef>
+                <a:spcPct val="20000"/>
+              </a:spcBef>
+              <a:buChar char="–"/>
+              <a:defRPr sz="2800">
+                <a:solidFill>
+                  <a:schemeClr val="tx1"/>
+                </a:solidFill>
+                <a:latin typeface="Times New Roman" panose="02020603050405020304" pitchFamily="18" charset="0"/>
+              </a:defRPr>
+            </a:lvl2pPr>
+            <a:lvl3pPr marL="1143000" indent="-228600">
+              <a:spcBef>
+                <a:spcPct val="20000"/>
+              </a:spcBef>
+              <a:buChar char="•"/>
+              <a:defRPr sz="2400">
+                <a:solidFill>
+                  <a:schemeClr val="tx1"/>
+                </a:solidFill>
+                <a:latin typeface="Times New Roman" panose="02020603050405020304" pitchFamily="18" charset="0"/>
+              </a:defRPr>
+            </a:lvl3pPr>
+            <a:lvl4pPr marL="1600200" indent="-228600">
+              <a:spcBef>
+                <a:spcPct val="20000"/>
+              </a:spcBef>
+              <a:buChar char="–"/>
+              <a:defRPr sz="2000">
+                <a:solidFill>
+                  <a:schemeClr val="tx1"/>
+                </a:solidFill>
+                <a:latin typeface="Times New Roman" panose="02020603050405020304" pitchFamily="18" charset="0"/>
+              </a:defRPr>
+            </a:lvl4pPr>
+            <a:lvl5pPr marL="2057400" indent="-228600">
+              <a:spcBef>
+                <a:spcPct val="20000"/>
+              </a:spcBef>
+              <a:buChar char="»"/>
+              <a:defRPr sz="2000">
+                <a:solidFill>
+                  <a:schemeClr val="tx1"/>
+                </a:solidFill>
+                <a:latin typeface="Times New Roman" panose="02020603050405020304" pitchFamily="18" charset="0"/>
+              </a:defRPr>
+            </a:lvl5pPr>
+            <a:lvl6pPr marL="2514600" indent="-228600" eaLnBrk="0" fontAlgn="base" hangingPunct="0">
+              <a:spcBef>
+                <a:spcPct val="20000"/>
+              </a:spcBef>
+              <a:spcAft>
+                <a:spcPct val="0"/>
+              </a:spcAft>
+              <a:buChar char="»"/>
+              <a:defRPr sz="2000">
+                <a:solidFill>
+                  <a:schemeClr val="tx1"/>
+                </a:solidFill>
+                <a:latin typeface="Times New Roman" panose="02020603050405020304" pitchFamily="18" charset="0"/>
+              </a:defRPr>
+            </a:lvl6pPr>
+            <a:lvl7pPr marL="2971800" indent="-228600" eaLnBrk="0" fontAlgn="base" hangingPunct="0">
+              <a:spcBef>
+                <a:spcPct val="20000"/>
+              </a:spcBef>
+              <a:spcAft>
+                <a:spcPct val="0"/>
+              </a:spcAft>
+              <a:buChar char="»"/>
+              <a:defRPr sz="2000">
+                <a:solidFill>
+                  <a:schemeClr val="tx1"/>
+                </a:solidFill>
+                <a:latin typeface="Times New Roman" panose="02020603050405020304" pitchFamily="18" charset="0"/>
+              </a:defRPr>
+            </a:lvl7pPr>
+            <a:lvl8pPr marL="3429000" indent="-228600" eaLnBrk="0" fontAlgn="base" hangingPunct="0">
+              <a:spcBef>
+                <a:spcPct val="20000"/>
+              </a:spcBef>
+              <a:spcAft>
+                <a:spcPct val="0"/>
+              </a:spcAft>
+              <a:buChar char="»"/>
+              <a:defRPr sz="2000">
+                <a:solidFill>
+                  <a:schemeClr val="tx1"/>
+                </a:solidFill>
+                <a:latin typeface="Times New Roman" panose="02020603050405020304" pitchFamily="18" charset="0"/>
+              </a:defRPr>
+            </a:lvl8pPr>
+            <a:lvl9pPr marL="3886200" indent="-228600" eaLnBrk="0" fontAlgn="base" hangingPunct="0">
+              <a:spcBef>
+                <a:spcPct val="20000"/>
+              </a:spcBef>
+              <a:spcAft>
+                <a:spcPct val="0"/>
+              </a:spcAft>
+              <a:buChar char="»"/>
+              <a:defRPr sz="2000">
+                <a:solidFill>
+                  <a:schemeClr val="tx1"/>
+                </a:solidFill>
+                <a:latin typeface="Times New Roman" panose="02020603050405020304" pitchFamily="18" charset="0"/>
+              </a:defRPr>
+            </a:lvl9pPr>
+          </a:lstStyle>
+          <a:p>
+            <a:pPr>
+              <a:spcBef>
+                <a:spcPct val="0"/>
+              </a:spcBef>
+              <a:buFontTx/>
+              <a:buNone/>
+            </a:pPr>
+            <a:r>
+              <a:rPr lang="en-US" sz="1600" dirty="0"/>
+              <a:t>1</a:t>
             </a:r>
           </a:p>
         </p:txBody>

</xml_diff>

<commit_message>
adding tree lab files
</commit_message>
<xml_diff>
--- a/Labs/Hashing Lab/Hashing Lab S2020.pptx
+++ b/Labs/Hashing Lab/Hashing Lab S2020.pptx
@@ -239,7 +239,7 @@
           <a:p>
             <a:fld id="{38585FD9-73E9-4662-9A33-270BCE8599E1}" type="datetimeFigureOut">
               <a:rPr lang="en-US" smtClean="0"/>
-              <a:t>3/24/2020</a:t>
+              <a:t>3/25/2020</a:t>
             </a:fld>
             <a:endParaRPr lang="en-US"/>
           </a:p>
@@ -7712,7 +7712,7 @@
                 <a:pPr algn="ctr"/>
                 <a:r>
                   <a:rPr lang="en-US" sz="1200" dirty="0"/>
-                  <a:t>21</a:t>
+                  <a:t>121</a:t>
                 </a:r>
               </a:p>
             </p:txBody>
@@ -7849,7 +7849,7 @@
                 <a:pPr algn="ctr"/>
                 <a:r>
                   <a:rPr lang="en-US" sz="1200" dirty="0"/>
-                  <a:t>2</a:t>
+                  <a:t>12</a:t>
                 </a:r>
               </a:p>
             </p:txBody>
@@ -7986,7 +7986,7 @@
                 <a:pPr algn="ctr"/>
                 <a:r>
                   <a:rPr lang="en-US" sz="1200" dirty="0"/>
-                  <a:t>123</a:t>
+                  <a:t>53</a:t>
                 </a:r>
               </a:p>
             </p:txBody>
@@ -8123,7 +8123,7 @@
                 <a:pPr algn="ctr"/>
                 <a:r>
                   <a:rPr lang="en-US" sz="1200" dirty="0"/>
-                  <a:t>4</a:t>
+                  <a:t>114</a:t>
                 </a:r>
               </a:p>
             </p:txBody>
@@ -9195,7 +9195,7 @@
             <a:pPr algn="ctr"/>
             <a:r>
               <a:rPr lang="en-US" sz="1200" dirty="0"/>
-              <a:t>121</a:t>
+              <a:t>21</a:t>
             </a:r>
           </a:p>
         </p:txBody>
@@ -9481,7 +9481,7 @@
             <a:pPr algn="ctr"/>
             <a:r>
               <a:rPr lang="en-US" sz="1200" dirty="0"/>
-              <a:t>53</a:t>
+              <a:t>123</a:t>
             </a:r>
           </a:p>
         </p:txBody>
@@ -9624,150 +9624,7 @@
             <a:pPr algn="ctr"/>
             <a:r>
               <a:rPr lang="en-US" sz="1200" dirty="0"/>
-              <a:t>114</a:t>
-            </a:r>
-          </a:p>
-        </p:txBody>
-      </p:sp>
-      <p:sp>
-        <p:nvSpPr>
-          <p:cNvPr id="51" name="Rectangle 8">
-            <a:extLst>
-              <a:ext uri="{FF2B5EF4-FFF2-40B4-BE49-F238E27FC236}">
-                <a16:creationId xmlns:a16="http://schemas.microsoft.com/office/drawing/2014/main" id="{87168AC1-DCED-47FB-8059-C4C667693AA8}"/>
-              </a:ext>
-            </a:extLst>
-          </p:cNvPr>
-          <p:cNvSpPr>
-            <a:spLocks noChangeArrowheads="1"/>
-          </p:cNvSpPr>
-          <p:nvPr/>
-        </p:nvSpPr>
-        <p:spPr bwMode="auto">
-          <a:xfrm>
-            <a:off x="6676026" y="2231677"/>
-            <a:ext cx="454836" cy="226753"/>
-          </a:xfrm>
-          <a:prstGeom prst="rect">
-            <a:avLst/>
-          </a:prstGeom>
-          <a:solidFill>
-            <a:schemeClr val="bg1"/>
-          </a:solidFill>
-          <a:ln w="9525" algn="ctr">
-            <a:solidFill>
-              <a:schemeClr val="tx1"/>
-            </a:solidFill>
-            <a:round/>
-            <a:headEnd/>
-            <a:tailEnd/>
-          </a:ln>
-        </p:spPr>
-        <p:txBody>
-          <a:bodyPr lIns="0" tIns="0" rIns="0" bIns="0"/>
-          <a:lstStyle>
-            <a:lvl1pPr>
-              <a:defRPr sz="2400">
-                <a:solidFill>
-                  <a:schemeClr val="tx1"/>
-                </a:solidFill>
-                <a:latin typeface="Times New Roman" panose="02020603050405020304" pitchFamily="18" charset="0"/>
-              </a:defRPr>
-            </a:lvl1pPr>
-            <a:lvl2pPr marL="742950" indent="-285750">
-              <a:defRPr sz="2400">
-                <a:solidFill>
-                  <a:schemeClr val="tx1"/>
-                </a:solidFill>
-                <a:latin typeface="Times New Roman" panose="02020603050405020304" pitchFamily="18" charset="0"/>
-              </a:defRPr>
-            </a:lvl2pPr>
-            <a:lvl3pPr marL="1143000" indent="-228600">
-              <a:defRPr sz="2400">
-                <a:solidFill>
-                  <a:schemeClr val="tx1"/>
-                </a:solidFill>
-                <a:latin typeface="Times New Roman" panose="02020603050405020304" pitchFamily="18" charset="0"/>
-              </a:defRPr>
-            </a:lvl3pPr>
-            <a:lvl4pPr marL="1600200" indent="-228600">
-              <a:defRPr sz="2400">
-                <a:solidFill>
-                  <a:schemeClr val="tx1"/>
-                </a:solidFill>
-                <a:latin typeface="Times New Roman" panose="02020603050405020304" pitchFamily="18" charset="0"/>
-              </a:defRPr>
-            </a:lvl4pPr>
-            <a:lvl5pPr marL="2057400" indent="-228600">
-              <a:defRPr sz="2400">
-                <a:solidFill>
-                  <a:schemeClr val="tx1"/>
-                </a:solidFill>
-                <a:latin typeface="Times New Roman" panose="02020603050405020304" pitchFamily="18" charset="0"/>
-              </a:defRPr>
-            </a:lvl5pPr>
-            <a:lvl6pPr marL="2514600" indent="-228600" eaLnBrk="0" fontAlgn="base" hangingPunct="0">
-              <a:spcBef>
-                <a:spcPct val="0"/>
-              </a:spcBef>
-              <a:spcAft>
-                <a:spcPct val="0"/>
-              </a:spcAft>
-              <a:defRPr sz="2400">
-                <a:solidFill>
-                  <a:schemeClr val="tx1"/>
-                </a:solidFill>
-                <a:latin typeface="Times New Roman" panose="02020603050405020304" pitchFamily="18" charset="0"/>
-              </a:defRPr>
-            </a:lvl6pPr>
-            <a:lvl7pPr marL="2971800" indent="-228600" eaLnBrk="0" fontAlgn="base" hangingPunct="0">
-              <a:spcBef>
-                <a:spcPct val="0"/>
-              </a:spcBef>
-              <a:spcAft>
-                <a:spcPct val="0"/>
-              </a:spcAft>
-              <a:defRPr sz="2400">
-                <a:solidFill>
-                  <a:schemeClr val="tx1"/>
-                </a:solidFill>
-                <a:latin typeface="Times New Roman" panose="02020603050405020304" pitchFamily="18" charset="0"/>
-              </a:defRPr>
-            </a:lvl7pPr>
-            <a:lvl8pPr marL="3429000" indent="-228600" eaLnBrk="0" fontAlgn="base" hangingPunct="0">
-              <a:spcBef>
-                <a:spcPct val="0"/>
-              </a:spcBef>
-              <a:spcAft>
-                <a:spcPct val="0"/>
-              </a:spcAft>
-              <a:defRPr sz="2400">
-                <a:solidFill>
-                  <a:schemeClr val="tx1"/>
-                </a:solidFill>
-                <a:latin typeface="Times New Roman" panose="02020603050405020304" pitchFamily="18" charset="0"/>
-              </a:defRPr>
-            </a:lvl8pPr>
-            <a:lvl9pPr marL="3886200" indent="-228600" eaLnBrk="0" fontAlgn="base" hangingPunct="0">
-              <a:spcBef>
-                <a:spcPct val="0"/>
-              </a:spcBef>
-              <a:spcAft>
-                <a:spcPct val="0"/>
-              </a:spcAft>
-              <a:defRPr sz="2400">
-                <a:solidFill>
-                  <a:schemeClr val="tx1"/>
-                </a:solidFill>
-                <a:latin typeface="Times New Roman" panose="02020603050405020304" pitchFamily="18" charset="0"/>
-              </a:defRPr>
-            </a:lvl9pPr>
-          </a:lstStyle>
-          <a:p>
-            <a:pPr algn="ctr"/>
-            <a:r>
-              <a:rPr lang="en-US" sz="1200" dirty="0"/>
-              <a:t>12</a:t>
+              <a:t>4</a:t>
             </a:r>
           </a:p>
         </p:txBody>
@@ -12575,7 +12432,7 @@
             </a:pPr>
             <a:r>
               <a:rPr lang="en-US" sz="1600" dirty="0"/>
-              <a:t>3</a:t>
+              <a:t>1</a:t>
             </a:r>
           </a:p>
         </p:txBody>
@@ -12762,7 +12619,7 @@
             </a:pPr>
             <a:r>
               <a:rPr lang="en-US" sz="1600" dirty="0"/>
-              <a:t>1</a:t>
+              <a:t>2</a:t>
             </a:r>
           </a:p>
         </p:txBody>
@@ -12949,7 +12806,7 @@
             </a:pPr>
             <a:r>
               <a:rPr lang="en-US" sz="1600" dirty="0"/>
-              <a:t>2</a:t>
+              <a:t>1</a:t>
             </a:r>
           </a:p>
         </p:txBody>
@@ -13323,7 +13180,7 @@
             </a:pPr>
             <a:r>
               <a:rPr lang="en-US" sz="1600" dirty="0"/>
-              <a:t>1</a:t>
+              <a:t>2</a:t>
             </a:r>
           </a:p>
         </p:txBody>
@@ -13510,7 +13367,7 @@
             </a:pPr>
             <a:r>
               <a:rPr lang="en-US" sz="1600" dirty="0"/>
-              <a:t>3</a:t>
+              <a:t>1</a:t>
             </a:r>
           </a:p>
         </p:txBody>

</xml_diff>